<commit_message>
checked and updated d2/s1 slides
</commit_message>
<xml_diff>
--- a/doc/slides/day2/session1/CLIScripting.pptx
+++ b/doc/slides/day2/session1/CLIScripting.pptx
@@ -1,6 +1,6 @@
 
 <file path=ppt/presentation.xml><?xml version="1.0" encoding="utf-8"?>
-<p:presentation xmlns:a="http://schemas.openxmlformats.org/drawingml/2006/main" xmlns:r="http://schemas.openxmlformats.org/officeDocument/2006/relationships" xmlns:mc="http://schemas.openxmlformats.org/markup-compatibility/2006" xmlns:mv="urn:schemas-microsoft-com:mac:vml" xmlns:p="http://schemas.openxmlformats.org/presentationml/2006/main" mc:Ignorable="mv" mc:PreserveAttributes="mv:*" saveSubsetFonts="1" autoCompressPictures="0">
+<p:presentation xmlns:a="http://schemas.openxmlformats.org/drawingml/2006/main" xmlns:r="http://schemas.openxmlformats.org/officeDocument/2006/relationships" xmlns:p="http://schemas.openxmlformats.org/presentationml/2006/main" saveSubsetFonts="1" autoCompressPictures="0">
   <p:sldMasterIdLst>
     <p:sldMasterId id="2147483648" r:id="rId1"/>
   </p:sldMasterIdLst>
@@ -126,7 +126,7 @@
 </file>
 
 <file path=ppt/notesMasters/notesMaster1.xml><?xml version="1.0" encoding="utf-8"?>
-<p:notesMaster xmlns:a="http://schemas.openxmlformats.org/drawingml/2006/main" xmlns:r="http://schemas.openxmlformats.org/officeDocument/2006/relationships" xmlns:mc="http://schemas.openxmlformats.org/markup-compatibility/2006" xmlns:mv="urn:schemas-microsoft-com:mac:vml" xmlns:p="http://schemas.openxmlformats.org/presentationml/2006/main" mc:Ignorable="mv" mc:PreserveAttributes="mv:*">
+<p:notesMaster xmlns:a="http://schemas.openxmlformats.org/drawingml/2006/main" xmlns:r="http://schemas.openxmlformats.org/officeDocument/2006/relationships" xmlns:p="http://schemas.openxmlformats.org/presentationml/2006/main">
   <p:cSld>
     <p:bg>
       <p:bgRef idx="1001">
@@ -208,7 +208,7 @@
             <a:fld id="{BEBD7BB8-CB0F-3147-8597-AF5DC6013C28}" type="datetimeFigureOut">
               <a:rPr lang="en-US" smtClean="0"/>
               <a:pPr/>
-              <a:t>9/10/12</a:t>
+              <a:t>10/17/13</a:t>
             </a:fld>
             <a:endParaRPr lang="en-US"/>
           </a:p>
@@ -370,13 +370,18 @@
             <a:fld id="{4D83696D-1FDB-3747-BF38-2B83E9AFCFF7}" type="slidenum">
               <a:rPr lang="en-US" smtClean="0"/>
               <a:pPr/>
-              <a:t>‹#›</a:t>
+              <a:t>‹nr.›</a:t>
             </a:fld>
             <a:endParaRPr lang="en-US"/>
           </a:p>
         </p:txBody>
       </p:sp>
     </p:spTree>
+    <p:extLst>
+      <p:ext uri="{BB962C8B-B14F-4D97-AF65-F5344CB8AC3E}">
+        <p14:creationId xmlns:p14="http://schemas.microsoft.com/office/powerpoint/2010/main" val="2472587388"/>
+      </p:ext>
+    </p:extLst>
   </p:cSld>
   <p:clrMap bg1="lt1" tx1="dk1" bg2="lt2" tx2="dk2" accent1="accent1" accent2="accent2" accent3="accent3" accent4="accent4" accent5="accent5" accent6="accent6" hlink="hlink" folHlink="folHlink"/>
   <p:notesStyle>
@@ -475,7 +480,7 @@
 </file>
 
 <file path=ppt/notesSlides/notesSlide1.xml><?xml version="1.0" encoding="utf-8"?>
-<p:notes xmlns:a="http://schemas.openxmlformats.org/drawingml/2006/main" xmlns:r="http://schemas.openxmlformats.org/officeDocument/2006/relationships" xmlns:mc="http://schemas.openxmlformats.org/markup-compatibility/2006" xmlns:mv="urn:schemas-microsoft-com:mac:vml" xmlns:p="http://schemas.openxmlformats.org/presentationml/2006/main" mc:Ignorable="mv" mc:PreserveAttributes="mv:*">
+<p:notes xmlns:a="http://schemas.openxmlformats.org/drawingml/2006/main" xmlns:r="http://schemas.openxmlformats.org/officeDocument/2006/relationships" xmlns:p="http://schemas.openxmlformats.org/presentationml/2006/main">
   <p:cSld>
     <p:spTree>
       <p:nvGrpSpPr>
@@ -561,7 +566,7 @@
 </file>
 
 <file path=ppt/notesSlides/notesSlide2.xml><?xml version="1.0" encoding="utf-8"?>
-<p:notes xmlns:a="http://schemas.openxmlformats.org/drawingml/2006/main" xmlns:r="http://schemas.openxmlformats.org/officeDocument/2006/relationships" xmlns:mc="http://schemas.openxmlformats.org/markup-compatibility/2006" xmlns:mv="urn:schemas-microsoft-com:mac:vml" xmlns:p="http://schemas.openxmlformats.org/presentationml/2006/main" mc:Ignorable="mv" mc:PreserveAttributes="mv:*">
+<p:notes xmlns:a="http://schemas.openxmlformats.org/drawingml/2006/main" xmlns:r="http://schemas.openxmlformats.org/officeDocument/2006/relationships" xmlns:p="http://schemas.openxmlformats.org/presentationml/2006/main">
   <p:cSld>
     <p:spTree>
       <p:nvGrpSpPr>
@@ -655,7 +660,7 @@
 </file>
 
 <file path=ppt/slideLayouts/slideLayout1.xml><?xml version="1.0" encoding="utf-8"?>
-<p:sldLayout xmlns:a="http://schemas.openxmlformats.org/drawingml/2006/main" xmlns:r="http://schemas.openxmlformats.org/officeDocument/2006/relationships" xmlns:mc="http://schemas.openxmlformats.org/markup-compatibility/2006" xmlns:mv="urn:schemas-microsoft-com:mac:vml" xmlns:p="http://schemas.openxmlformats.org/presentationml/2006/main" mc:Ignorable="mv" mc:PreserveAttributes="mv:*" type="title" preserve="1">
+<p:sldLayout xmlns:a="http://schemas.openxmlformats.org/drawingml/2006/main" xmlns:r="http://schemas.openxmlformats.org/officeDocument/2006/relationships" xmlns:p="http://schemas.openxmlformats.org/presentationml/2006/main" type="title" preserve="1">
   <p:cSld name="Title Slide">
     <p:spTree>
       <p:nvGrpSpPr>
@@ -836,7 +841,7 @@
             <a:fld id="{49072BD6-7320-8A4C-B5BF-960FC4D05047}" type="datetimeFigureOut">
               <a:rPr lang="en-US" smtClean="0"/>
               <a:pPr/>
-              <a:t>9/10/12</a:t>
+              <a:t>10/17/13</a:t>
             </a:fld>
             <a:endParaRPr lang="en-US"/>
           </a:p>
@@ -879,7 +884,7 @@
             <a:fld id="{7E8E7A17-0B47-BE40-9CC8-68FDC404C4A8}" type="slidenum">
               <a:rPr lang="en-US" smtClean="0"/>
               <a:pPr/>
-              <a:t>‹#›</a:t>
+              <a:t>‹nr.›</a:t>
             </a:fld>
             <a:endParaRPr lang="en-US"/>
           </a:p>
@@ -894,7 +899,7 @@
 </file>
 
 <file path=ppt/slideLayouts/slideLayout10.xml><?xml version="1.0" encoding="utf-8"?>
-<p:sldLayout xmlns:a="http://schemas.openxmlformats.org/drawingml/2006/main" xmlns:r="http://schemas.openxmlformats.org/officeDocument/2006/relationships" xmlns:mc="http://schemas.openxmlformats.org/markup-compatibility/2006" xmlns:mv="urn:schemas-microsoft-com:mac:vml" xmlns:p="http://schemas.openxmlformats.org/presentationml/2006/main" mc:Ignorable="mv" mc:PreserveAttributes="mv:*" type="vertTx" preserve="1">
+<p:sldLayout xmlns:a="http://schemas.openxmlformats.org/drawingml/2006/main" xmlns:r="http://schemas.openxmlformats.org/officeDocument/2006/relationships" xmlns:p="http://schemas.openxmlformats.org/presentationml/2006/main" type="vertTx" preserve="1">
   <p:cSld name="Title and Vertical Text">
     <p:spTree>
       <p:nvGrpSpPr>
@@ -1003,7 +1008,7 @@
             <a:fld id="{49072BD6-7320-8A4C-B5BF-960FC4D05047}" type="datetimeFigureOut">
               <a:rPr lang="en-US" smtClean="0"/>
               <a:pPr/>
-              <a:t>9/10/12</a:t>
+              <a:t>10/17/13</a:t>
             </a:fld>
             <a:endParaRPr lang="en-US"/>
           </a:p>
@@ -1046,7 +1051,7 @@
             <a:fld id="{7E8E7A17-0B47-BE40-9CC8-68FDC404C4A8}" type="slidenum">
               <a:rPr lang="en-US" smtClean="0"/>
               <a:pPr/>
-              <a:t>‹#›</a:t>
+              <a:t>‹nr.›</a:t>
             </a:fld>
             <a:endParaRPr lang="en-US"/>
           </a:p>
@@ -1061,7 +1066,7 @@
 </file>
 
 <file path=ppt/slideLayouts/slideLayout11.xml><?xml version="1.0" encoding="utf-8"?>
-<p:sldLayout xmlns:a="http://schemas.openxmlformats.org/drawingml/2006/main" xmlns:r="http://schemas.openxmlformats.org/officeDocument/2006/relationships" xmlns:mc="http://schemas.openxmlformats.org/markup-compatibility/2006" xmlns:mv="urn:schemas-microsoft-com:mac:vml" xmlns:p="http://schemas.openxmlformats.org/presentationml/2006/main" mc:Ignorable="mv" mc:PreserveAttributes="mv:*" type="vertTitleAndTx" preserve="1">
+<p:sldLayout xmlns:a="http://schemas.openxmlformats.org/drawingml/2006/main" xmlns:r="http://schemas.openxmlformats.org/officeDocument/2006/relationships" xmlns:p="http://schemas.openxmlformats.org/presentationml/2006/main" type="vertTitleAndTx" preserve="1">
   <p:cSld name="Vertical Title and Text">
     <p:spTree>
       <p:nvGrpSpPr>
@@ -1180,7 +1185,7 @@
             <a:fld id="{49072BD6-7320-8A4C-B5BF-960FC4D05047}" type="datetimeFigureOut">
               <a:rPr lang="en-US" smtClean="0"/>
               <a:pPr/>
-              <a:t>9/10/12</a:t>
+              <a:t>10/17/13</a:t>
             </a:fld>
             <a:endParaRPr lang="en-US"/>
           </a:p>
@@ -1223,7 +1228,7 @@
             <a:fld id="{7E8E7A17-0B47-BE40-9CC8-68FDC404C4A8}" type="slidenum">
               <a:rPr lang="en-US" smtClean="0"/>
               <a:pPr/>
-              <a:t>‹#›</a:t>
+              <a:t>‹nr.›</a:t>
             </a:fld>
             <a:endParaRPr lang="en-US"/>
           </a:p>
@@ -1238,7 +1243,7 @@
 </file>
 
 <file path=ppt/slideLayouts/slideLayout2.xml><?xml version="1.0" encoding="utf-8"?>
-<p:sldLayout xmlns:a="http://schemas.openxmlformats.org/drawingml/2006/main" xmlns:r="http://schemas.openxmlformats.org/officeDocument/2006/relationships" xmlns:mc="http://schemas.openxmlformats.org/markup-compatibility/2006" xmlns:mv="urn:schemas-microsoft-com:mac:vml" xmlns:p="http://schemas.openxmlformats.org/presentationml/2006/main" mc:Ignorable="mv" mc:PreserveAttributes="mv:*" type="obj" preserve="1">
+<p:sldLayout xmlns:a="http://schemas.openxmlformats.org/drawingml/2006/main" xmlns:r="http://schemas.openxmlformats.org/officeDocument/2006/relationships" xmlns:p="http://schemas.openxmlformats.org/presentationml/2006/main" type="obj" preserve="1">
   <p:cSld name="Title and Content">
     <p:spTree>
       <p:nvGrpSpPr>
@@ -1347,7 +1352,7 @@
             <a:fld id="{49072BD6-7320-8A4C-B5BF-960FC4D05047}" type="datetimeFigureOut">
               <a:rPr lang="en-US" smtClean="0"/>
               <a:pPr/>
-              <a:t>9/10/12</a:t>
+              <a:t>10/17/13</a:t>
             </a:fld>
             <a:endParaRPr lang="en-US"/>
           </a:p>
@@ -1390,7 +1395,7 @@
             <a:fld id="{7E8E7A17-0B47-BE40-9CC8-68FDC404C4A8}" type="slidenum">
               <a:rPr lang="en-US" smtClean="0"/>
               <a:pPr/>
-              <a:t>‹#›</a:t>
+              <a:t>‹nr.›</a:t>
             </a:fld>
             <a:endParaRPr lang="en-US"/>
           </a:p>
@@ -1405,7 +1410,7 @@
 </file>
 
 <file path=ppt/slideLayouts/slideLayout3.xml><?xml version="1.0" encoding="utf-8"?>
-<p:sldLayout xmlns:a="http://schemas.openxmlformats.org/drawingml/2006/main" xmlns:r="http://schemas.openxmlformats.org/officeDocument/2006/relationships" xmlns:mc="http://schemas.openxmlformats.org/markup-compatibility/2006" xmlns:mv="urn:schemas-microsoft-com:mac:vml" xmlns:p="http://schemas.openxmlformats.org/presentationml/2006/main" mc:Ignorable="mv" mc:PreserveAttributes="mv:*" type="secHead" preserve="1">
+<p:sldLayout xmlns:a="http://schemas.openxmlformats.org/drawingml/2006/main" xmlns:r="http://schemas.openxmlformats.org/officeDocument/2006/relationships" xmlns:p="http://schemas.openxmlformats.org/presentationml/2006/main" type="secHead" preserve="1">
   <p:cSld name="Section Header">
     <p:spTree>
       <p:nvGrpSpPr>
@@ -1590,7 +1595,7 @@
             <a:fld id="{49072BD6-7320-8A4C-B5BF-960FC4D05047}" type="datetimeFigureOut">
               <a:rPr lang="en-US" smtClean="0"/>
               <a:pPr/>
-              <a:t>9/10/12</a:t>
+              <a:t>10/17/13</a:t>
             </a:fld>
             <a:endParaRPr lang="en-US"/>
           </a:p>
@@ -1633,7 +1638,7 @@
             <a:fld id="{7E8E7A17-0B47-BE40-9CC8-68FDC404C4A8}" type="slidenum">
               <a:rPr lang="en-US" smtClean="0"/>
               <a:pPr/>
-              <a:t>‹#›</a:t>
+              <a:t>‹nr.›</a:t>
             </a:fld>
             <a:endParaRPr lang="en-US"/>
           </a:p>
@@ -1648,7 +1653,7 @@
 </file>
 
 <file path=ppt/slideLayouts/slideLayout4.xml><?xml version="1.0" encoding="utf-8"?>
-<p:sldLayout xmlns:a="http://schemas.openxmlformats.org/drawingml/2006/main" xmlns:r="http://schemas.openxmlformats.org/officeDocument/2006/relationships" xmlns:mc="http://schemas.openxmlformats.org/markup-compatibility/2006" xmlns:mv="urn:schemas-microsoft-com:mac:vml" xmlns:p="http://schemas.openxmlformats.org/presentationml/2006/main" mc:Ignorable="mv" mc:PreserveAttributes="mv:*" type="twoObj" preserve="1">
+<p:sldLayout xmlns:a="http://schemas.openxmlformats.org/drawingml/2006/main" xmlns:r="http://schemas.openxmlformats.org/officeDocument/2006/relationships" xmlns:p="http://schemas.openxmlformats.org/presentationml/2006/main" type="twoObj" preserve="1">
   <p:cSld name="Two Content">
     <p:spTree>
       <p:nvGrpSpPr>
@@ -1875,7 +1880,7 @@
             <a:fld id="{49072BD6-7320-8A4C-B5BF-960FC4D05047}" type="datetimeFigureOut">
               <a:rPr lang="en-US" smtClean="0"/>
               <a:pPr/>
-              <a:t>9/10/12</a:t>
+              <a:t>10/17/13</a:t>
             </a:fld>
             <a:endParaRPr lang="en-US"/>
           </a:p>
@@ -1918,7 +1923,7 @@
             <a:fld id="{7E8E7A17-0B47-BE40-9CC8-68FDC404C4A8}" type="slidenum">
               <a:rPr lang="en-US" smtClean="0"/>
               <a:pPr/>
-              <a:t>‹#›</a:t>
+              <a:t>‹nr.›</a:t>
             </a:fld>
             <a:endParaRPr lang="en-US"/>
           </a:p>
@@ -1933,7 +1938,7 @@
 </file>
 
 <file path=ppt/slideLayouts/slideLayout5.xml><?xml version="1.0" encoding="utf-8"?>
-<p:sldLayout xmlns:a="http://schemas.openxmlformats.org/drawingml/2006/main" xmlns:r="http://schemas.openxmlformats.org/officeDocument/2006/relationships" xmlns:mc="http://schemas.openxmlformats.org/markup-compatibility/2006" xmlns:mv="urn:schemas-microsoft-com:mac:vml" xmlns:p="http://schemas.openxmlformats.org/presentationml/2006/main" mc:Ignorable="mv" mc:PreserveAttributes="mv:*" type="twoTxTwoObj" preserve="1">
+<p:sldLayout xmlns:a="http://schemas.openxmlformats.org/drawingml/2006/main" xmlns:r="http://schemas.openxmlformats.org/officeDocument/2006/relationships" xmlns:p="http://schemas.openxmlformats.org/presentationml/2006/main" type="twoTxTwoObj" preserve="1">
   <p:cSld name="Comparison">
     <p:spTree>
       <p:nvGrpSpPr>
@@ -2294,7 +2299,7 @@
             <a:fld id="{49072BD6-7320-8A4C-B5BF-960FC4D05047}" type="datetimeFigureOut">
               <a:rPr lang="en-US" smtClean="0"/>
               <a:pPr/>
-              <a:t>9/10/12</a:t>
+              <a:t>10/17/13</a:t>
             </a:fld>
             <a:endParaRPr lang="en-US"/>
           </a:p>
@@ -2337,7 +2342,7 @@
             <a:fld id="{7E8E7A17-0B47-BE40-9CC8-68FDC404C4A8}" type="slidenum">
               <a:rPr lang="en-US" smtClean="0"/>
               <a:pPr/>
-              <a:t>‹#›</a:t>
+              <a:t>‹nr.›</a:t>
             </a:fld>
             <a:endParaRPr lang="en-US"/>
           </a:p>
@@ -2352,7 +2357,7 @@
 </file>
 
 <file path=ppt/slideLayouts/slideLayout6.xml><?xml version="1.0" encoding="utf-8"?>
-<p:sldLayout xmlns:a="http://schemas.openxmlformats.org/drawingml/2006/main" xmlns:r="http://schemas.openxmlformats.org/officeDocument/2006/relationships" xmlns:mc="http://schemas.openxmlformats.org/markup-compatibility/2006" xmlns:mv="urn:schemas-microsoft-com:mac:vml" xmlns:p="http://schemas.openxmlformats.org/presentationml/2006/main" mc:Ignorable="mv" mc:PreserveAttributes="mv:*" type="titleOnly" preserve="1">
+<p:sldLayout xmlns:a="http://schemas.openxmlformats.org/drawingml/2006/main" xmlns:r="http://schemas.openxmlformats.org/officeDocument/2006/relationships" xmlns:p="http://schemas.openxmlformats.org/presentationml/2006/main" type="titleOnly" preserve="1">
   <p:cSld name="Title Only">
     <p:spTree>
       <p:nvGrpSpPr>
@@ -2409,7 +2414,7 @@
             <a:fld id="{49072BD6-7320-8A4C-B5BF-960FC4D05047}" type="datetimeFigureOut">
               <a:rPr lang="en-US" smtClean="0"/>
               <a:pPr/>
-              <a:t>9/10/12</a:t>
+              <a:t>10/17/13</a:t>
             </a:fld>
             <a:endParaRPr lang="en-US"/>
           </a:p>
@@ -2452,7 +2457,7 @@
             <a:fld id="{7E8E7A17-0B47-BE40-9CC8-68FDC404C4A8}" type="slidenum">
               <a:rPr lang="en-US" smtClean="0"/>
               <a:pPr/>
-              <a:t>‹#›</a:t>
+              <a:t>‹nr.›</a:t>
             </a:fld>
             <a:endParaRPr lang="en-US"/>
           </a:p>
@@ -2467,7 +2472,7 @@
 </file>
 
 <file path=ppt/slideLayouts/slideLayout7.xml><?xml version="1.0" encoding="utf-8"?>
-<p:sldLayout xmlns:a="http://schemas.openxmlformats.org/drawingml/2006/main" xmlns:r="http://schemas.openxmlformats.org/officeDocument/2006/relationships" xmlns:mc="http://schemas.openxmlformats.org/markup-compatibility/2006" xmlns:mv="urn:schemas-microsoft-com:mac:vml" xmlns:p="http://schemas.openxmlformats.org/presentationml/2006/main" mc:Ignorable="mv" mc:PreserveAttributes="mv:*" type="blank" preserve="1">
+<p:sldLayout xmlns:a="http://schemas.openxmlformats.org/drawingml/2006/main" xmlns:r="http://schemas.openxmlformats.org/officeDocument/2006/relationships" xmlns:p="http://schemas.openxmlformats.org/presentationml/2006/main" type="blank" preserve="1">
   <p:cSld name="Blank">
     <p:spTree>
       <p:nvGrpSpPr>
@@ -2501,7 +2506,7 @@
             <a:fld id="{49072BD6-7320-8A4C-B5BF-960FC4D05047}" type="datetimeFigureOut">
               <a:rPr lang="en-US" smtClean="0"/>
               <a:pPr/>
-              <a:t>9/10/12</a:t>
+              <a:t>10/17/13</a:t>
             </a:fld>
             <a:endParaRPr lang="en-US"/>
           </a:p>
@@ -2544,7 +2549,7 @@
             <a:fld id="{7E8E7A17-0B47-BE40-9CC8-68FDC404C4A8}" type="slidenum">
               <a:rPr lang="en-US" smtClean="0"/>
               <a:pPr/>
-              <a:t>‹#›</a:t>
+              <a:t>‹nr.›</a:t>
             </a:fld>
             <a:endParaRPr lang="en-US"/>
           </a:p>
@@ -2559,7 +2564,7 @@
 </file>
 
 <file path=ppt/slideLayouts/slideLayout8.xml><?xml version="1.0" encoding="utf-8"?>
-<p:sldLayout xmlns:a="http://schemas.openxmlformats.org/drawingml/2006/main" xmlns:r="http://schemas.openxmlformats.org/officeDocument/2006/relationships" xmlns:mc="http://schemas.openxmlformats.org/markup-compatibility/2006" xmlns:mv="urn:schemas-microsoft-com:mac:vml" xmlns:p="http://schemas.openxmlformats.org/presentationml/2006/main" mc:Ignorable="mv" mc:PreserveAttributes="mv:*" type="objTx" preserve="1">
+<p:sldLayout xmlns:a="http://schemas.openxmlformats.org/drawingml/2006/main" xmlns:r="http://schemas.openxmlformats.org/officeDocument/2006/relationships" xmlns:p="http://schemas.openxmlformats.org/presentationml/2006/main" type="objTx" preserve="1">
   <p:cSld name="Content with Caption">
     <p:spTree>
       <p:nvGrpSpPr>
@@ -2775,7 +2780,7 @@
             <a:fld id="{49072BD6-7320-8A4C-B5BF-960FC4D05047}" type="datetimeFigureOut">
               <a:rPr lang="en-US" smtClean="0"/>
               <a:pPr/>
-              <a:t>9/10/12</a:t>
+              <a:t>10/17/13</a:t>
             </a:fld>
             <a:endParaRPr lang="en-US"/>
           </a:p>
@@ -2818,7 +2823,7 @@
             <a:fld id="{7E8E7A17-0B47-BE40-9CC8-68FDC404C4A8}" type="slidenum">
               <a:rPr lang="en-US" smtClean="0"/>
               <a:pPr/>
-              <a:t>‹#›</a:t>
+              <a:t>‹nr.›</a:t>
             </a:fld>
             <a:endParaRPr lang="en-US"/>
           </a:p>
@@ -2833,7 +2838,7 @@
 </file>
 
 <file path=ppt/slideLayouts/slideLayout9.xml><?xml version="1.0" encoding="utf-8"?>
-<p:sldLayout xmlns:a="http://schemas.openxmlformats.org/drawingml/2006/main" xmlns:r="http://schemas.openxmlformats.org/officeDocument/2006/relationships" xmlns:mc="http://schemas.openxmlformats.org/markup-compatibility/2006" xmlns:mv="urn:schemas-microsoft-com:mac:vml" xmlns:p="http://schemas.openxmlformats.org/presentationml/2006/main" mc:Ignorable="mv" mc:PreserveAttributes="mv:*" type="picTx" preserve="1">
+<p:sldLayout xmlns:a="http://schemas.openxmlformats.org/drawingml/2006/main" xmlns:r="http://schemas.openxmlformats.org/officeDocument/2006/relationships" xmlns:p="http://schemas.openxmlformats.org/presentationml/2006/main" type="picTx" preserve="1">
   <p:cSld name="Picture with Caption">
     <p:spTree>
       <p:nvGrpSpPr>
@@ -3025,7 +3030,7 @@
             <a:fld id="{49072BD6-7320-8A4C-B5BF-960FC4D05047}" type="datetimeFigureOut">
               <a:rPr lang="en-US" smtClean="0"/>
               <a:pPr/>
-              <a:t>9/10/12</a:t>
+              <a:t>10/17/13</a:t>
             </a:fld>
             <a:endParaRPr lang="en-US"/>
           </a:p>
@@ -3068,7 +3073,7 @@
             <a:fld id="{7E8E7A17-0B47-BE40-9CC8-68FDC404C4A8}" type="slidenum">
               <a:rPr lang="en-US" smtClean="0"/>
               <a:pPr/>
-              <a:t>‹#›</a:t>
+              <a:t>‹nr.›</a:t>
             </a:fld>
             <a:endParaRPr lang="en-US"/>
           </a:p>
@@ -3083,7 +3088,7 @@
 </file>
 
 <file path=ppt/slideMasters/slideMaster1.xml><?xml version="1.0" encoding="utf-8"?>
-<p:sldMaster xmlns:a="http://schemas.openxmlformats.org/drawingml/2006/main" xmlns:r="http://schemas.openxmlformats.org/officeDocument/2006/relationships" xmlns:mc="http://schemas.openxmlformats.org/markup-compatibility/2006" xmlns:mv="urn:schemas-microsoft-com:mac:vml" xmlns:p="http://schemas.openxmlformats.org/presentationml/2006/main" mc:Ignorable="mv" mc:PreserveAttributes="mv:*">
+<p:sldMaster xmlns:a="http://schemas.openxmlformats.org/drawingml/2006/main" xmlns:r="http://schemas.openxmlformats.org/officeDocument/2006/relationships" xmlns:p="http://schemas.openxmlformats.org/presentationml/2006/main">
   <p:cSld>
     <p:bg>
       <p:bgRef idx="1001">
@@ -3235,7 +3240,7 @@
             <a:fld id="{49072BD6-7320-8A4C-B5BF-960FC4D05047}" type="datetimeFigureOut">
               <a:rPr lang="en-US" smtClean="0"/>
               <a:pPr/>
-              <a:t>9/10/12</a:t>
+              <a:t>10/17/13</a:t>
             </a:fld>
             <a:endParaRPr lang="en-US"/>
           </a:p>
@@ -3314,7 +3319,7 @@
             <a:fld id="{7E8E7A17-0B47-BE40-9CC8-68FDC404C4A8}" type="slidenum">
               <a:rPr lang="en-US" smtClean="0"/>
               <a:pPr/>
-              <a:t>‹#›</a:t>
+              <a:t>‹nr.›</a:t>
             </a:fld>
             <a:endParaRPr lang="en-US"/>
           </a:p>
@@ -3590,7 +3595,7 @@
 </file>
 
 <file path=ppt/slides/slide1.xml><?xml version="1.0" encoding="utf-8"?>
-<p:sld xmlns:a="http://schemas.openxmlformats.org/drawingml/2006/main" xmlns:r="http://schemas.openxmlformats.org/officeDocument/2006/relationships" xmlns:mc="http://schemas.openxmlformats.org/markup-compatibility/2006" xmlns:mv="urn:schemas-microsoft-com:mac:vml" xmlns:p="http://schemas.openxmlformats.org/presentationml/2006/main" mc:Ignorable="mv" mc:PreserveAttributes="mv:*">
+<p:sld xmlns:a="http://schemas.openxmlformats.org/drawingml/2006/main" xmlns:r="http://schemas.openxmlformats.org/officeDocument/2006/relationships" xmlns:p="http://schemas.openxmlformats.org/presentationml/2006/main">
   <p:cSld>
     <p:spTree>
       <p:nvGrpSpPr>
@@ -3644,14 +3649,6 @@
           <a:bodyPr/>
           <a:lstStyle/>
           <a:p>
-            <a:r>
-              <a:rPr lang="en-US" dirty="0" smtClean="0"/>
-              <a:t>12 September 2012, 11:00</a:t>
-            </a:r>
-            <a:r>
-              <a:rPr lang="en-US" smtClean="0"/>
-              <a:t>-11.45</a:t>
-            </a:r>
             <a:endParaRPr lang="en-US" dirty="0"/>
           </a:p>
         </p:txBody>
@@ -3664,7 +3661,7 @@
   <p:timing>
     <p:tnLst>
       <p:par>
-        <p:cTn id="1" dur="indefinite" restart="never" nodeType="tmRoot"/>
+        <p:cTn xmlns:p14="http://schemas.microsoft.com/office/powerpoint/2010/main" id="1" dur="indefinite" restart="never" nodeType="tmRoot"/>
       </p:par>
     </p:tnLst>
   </p:timing>
@@ -3672,7 +3669,7 @@
 </file>
 
 <file path=ppt/slides/slide10.xml><?xml version="1.0" encoding="utf-8"?>
-<p:sld xmlns:a="http://schemas.openxmlformats.org/drawingml/2006/main" xmlns:r="http://schemas.openxmlformats.org/officeDocument/2006/relationships" xmlns:mc="http://schemas.openxmlformats.org/markup-compatibility/2006" xmlns:mv="urn:schemas-microsoft-com:mac:vml" xmlns:p="http://schemas.openxmlformats.org/presentationml/2006/main" mc:Ignorable="mv" mc:PreserveAttributes="mv:*">
+<p:sld xmlns:a="http://schemas.openxmlformats.org/drawingml/2006/main" xmlns:r="http://schemas.openxmlformats.org/officeDocument/2006/relationships" xmlns:p="http://schemas.openxmlformats.org/presentationml/2006/main">
   <p:cSld>
     <p:spTree>
       <p:nvGrpSpPr>
@@ -3799,7 +3796,7 @@
   <p:timing>
     <p:tnLst>
       <p:par>
-        <p:cTn id="1" dur="indefinite" restart="never" nodeType="tmRoot"/>
+        <p:cTn xmlns:p14="http://schemas.microsoft.com/office/powerpoint/2010/main" id="1" dur="indefinite" restart="never" nodeType="tmRoot"/>
       </p:par>
     </p:tnLst>
   </p:timing>
@@ -3807,7 +3804,7 @@
 </file>
 
 <file path=ppt/slides/slide11.xml><?xml version="1.0" encoding="utf-8"?>
-<p:sld xmlns:a="http://schemas.openxmlformats.org/drawingml/2006/main" xmlns:r="http://schemas.openxmlformats.org/officeDocument/2006/relationships" xmlns:mc="http://schemas.openxmlformats.org/markup-compatibility/2006" xmlns:mv="urn:schemas-microsoft-com:mac:vml" xmlns:p="http://schemas.openxmlformats.org/presentationml/2006/main" mc:Ignorable="mv" mc:PreserveAttributes="mv:*">
+<p:sld xmlns:a="http://schemas.openxmlformats.org/drawingml/2006/main" xmlns:r="http://schemas.openxmlformats.org/officeDocument/2006/relationships" xmlns:p="http://schemas.openxmlformats.org/presentationml/2006/main">
   <p:cSld>
     <p:spTree>
       <p:nvGrpSpPr>
@@ -4112,7 +4109,7 @@
   <p:timing>
     <p:tnLst>
       <p:par>
-        <p:cTn id="1" dur="indefinite" restart="never" nodeType="tmRoot"/>
+        <p:cTn xmlns:p14="http://schemas.microsoft.com/office/powerpoint/2010/main" id="1" dur="indefinite" restart="never" nodeType="tmRoot"/>
       </p:par>
     </p:tnLst>
   </p:timing>
@@ -4120,7 +4117,7 @@
 </file>
 
 <file path=ppt/slides/slide12.xml><?xml version="1.0" encoding="utf-8"?>
-<p:sld xmlns:a="http://schemas.openxmlformats.org/drawingml/2006/main" xmlns:r="http://schemas.openxmlformats.org/officeDocument/2006/relationships" xmlns:mc="http://schemas.openxmlformats.org/markup-compatibility/2006" xmlns:mv="urn:schemas-microsoft-com:mac:vml" xmlns:p="http://schemas.openxmlformats.org/presentationml/2006/main" mc:Ignorable="mv" mc:PreserveAttributes="mv:*">
+<p:sld xmlns:a="http://schemas.openxmlformats.org/drawingml/2006/main" xmlns:r="http://schemas.openxmlformats.org/officeDocument/2006/relationships" xmlns:p="http://schemas.openxmlformats.org/presentationml/2006/main">
   <p:cSld>
     <p:spTree>
       <p:nvGrpSpPr>
@@ -4250,7 +4247,7 @@
   <p:timing>
     <p:tnLst>
       <p:par>
-        <p:cTn id="1" dur="indefinite" restart="never" nodeType="tmRoot"/>
+        <p:cTn xmlns:p14="http://schemas.microsoft.com/office/powerpoint/2010/main" id="1" dur="indefinite" restart="never" nodeType="tmRoot"/>
       </p:par>
     </p:tnLst>
   </p:timing>
@@ -4258,7 +4255,7 @@
 </file>
 
 <file path=ppt/slides/slide13.xml><?xml version="1.0" encoding="utf-8"?>
-<p:sld xmlns:a="http://schemas.openxmlformats.org/drawingml/2006/main" xmlns:r="http://schemas.openxmlformats.org/officeDocument/2006/relationships" xmlns:mc="http://schemas.openxmlformats.org/markup-compatibility/2006" xmlns:mv="urn:schemas-microsoft-com:mac:vml" xmlns:p="http://schemas.openxmlformats.org/presentationml/2006/main" mc:Ignorable="mv" mc:PreserveAttributes="mv:*">
+<p:sld xmlns:a="http://schemas.openxmlformats.org/drawingml/2006/main" xmlns:r="http://schemas.openxmlformats.org/officeDocument/2006/relationships" xmlns:p="http://schemas.openxmlformats.org/presentationml/2006/main">
   <p:cSld>
     <p:spTree>
       <p:nvGrpSpPr>
@@ -4345,14 +4342,14 @@
                 <a:latin typeface="Courier New"/>
                 <a:cs typeface="Courier New"/>
               </a:rPr>
-              <a:t>ls</a:t>
+              <a:t>ls`</a:t>
             </a:r>
             <a:r>
               <a:rPr lang="en-US" dirty="0" smtClean="0">
                 <a:latin typeface="Courier New"/>
                 <a:cs typeface="Courier New"/>
               </a:rPr>
-              <a:t>`</a:t>
+              <a:t/>
             </a:r>
             <a:br>
               <a:rPr lang="en-US" dirty="0" smtClean="0">
@@ -4392,7 +4389,14 @@
                 <a:latin typeface="Courier New"/>
                 <a:cs typeface="Courier New"/>
               </a:rPr>
-              <a:t>$ echo $file</a:t>
+              <a:t>&gt; </a:t>
+            </a:r>
+            <a:r>
+              <a:rPr lang="en-US" dirty="0" smtClean="0">
+                <a:latin typeface="Courier New"/>
+                <a:cs typeface="Courier New"/>
+              </a:rPr>
+              <a:t>echo $file</a:t>
             </a:r>
             <a:br>
               <a:rPr lang="en-US" dirty="0" smtClean="0">
@@ -4405,7 +4409,14 @@
                 <a:latin typeface="Courier New"/>
                 <a:cs typeface="Courier New"/>
               </a:rPr>
-              <a:t>$ done</a:t>
+              <a:t>&gt; </a:t>
+            </a:r>
+            <a:r>
+              <a:rPr lang="en-US" dirty="0" smtClean="0">
+                <a:latin typeface="Courier New"/>
+                <a:cs typeface="Courier New"/>
+              </a:rPr>
+              <a:t>done</a:t>
             </a:r>
           </a:p>
           <a:p>
@@ -4425,7 +4436,7 @@
   <p:timing>
     <p:tnLst>
       <p:par>
-        <p:cTn id="1" dur="indefinite" restart="never" nodeType="tmRoot"/>
+        <p:cTn xmlns:p14="http://schemas.microsoft.com/office/powerpoint/2010/main" id="1" dur="indefinite" restart="never" nodeType="tmRoot"/>
       </p:par>
     </p:tnLst>
   </p:timing>
@@ -4433,7 +4444,7 @@
 </file>
 
 <file path=ppt/slides/slide14.xml><?xml version="1.0" encoding="utf-8"?>
-<p:sld xmlns:a="http://schemas.openxmlformats.org/drawingml/2006/main" xmlns:r="http://schemas.openxmlformats.org/officeDocument/2006/relationships" xmlns:mc="http://schemas.openxmlformats.org/markup-compatibility/2006" xmlns:mv="urn:schemas-microsoft-com:mac:vml" xmlns:p="http://schemas.openxmlformats.org/presentationml/2006/main" mc:Ignorable="mv" mc:PreserveAttributes="mv:*">
+<p:sld xmlns:a="http://schemas.openxmlformats.org/drawingml/2006/main" xmlns:r="http://schemas.openxmlformats.org/officeDocument/2006/relationships" xmlns:p="http://schemas.openxmlformats.org/presentationml/2006/main">
   <p:cSld>
     <p:spTree>
       <p:nvGrpSpPr>
@@ -5310,7 +5321,7 @@
   <p:timing>
     <p:tnLst>
       <p:par>
-        <p:cTn id="1" dur="indefinite" restart="never" nodeType="tmRoot"/>
+        <p:cTn xmlns:p14="http://schemas.microsoft.com/office/powerpoint/2010/main" id="1" dur="indefinite" restart="never" nodeType="tmRoot"/>
       </p:par>
     </p:tnLst>
   </p:timing>
@@ -5318,7 +5329,7 @@
 </file>
 
 <file path=ppt/slides/slide15.xml><?xml version="1.0" encoding="utf-8"?>
-<p:sld xmlns:a="http://schemas.openxmlformats.org/drawingml/2006/main" xmlns:r="http://schemas.openxmlformats.org/officeDocument/2006/relationships" xmlns:mc="http://schemas.openxmlformats.org/markup-compatibility/2006" xmlns:mv="urn:schemas-microsoft-com:mac:vml" xmlns:p="http://schemas.openxmlformats.org/presentationml/2006/main" mc:Ignorable="mv" mc:PreserveAttributes="mv:*">
+<p:sld xmlns:a="http://schemas.openxmlformats.org/drawingml/2006/main" xmlns:r="http://schemas.openxmlformats.org/officeDocument/2006/relationships" xmlns:p="http://schemas.openxmlformats.org/presentationml/2006/main">
   <p:cSld>
     <p:spTree>
       <p:nvGrpSpPr>
@@ -5391,7 +5402,11 @@
             </a:r>
             <a:r>
               <a:rPr lang="en-US" sz="2400" dirty="0" smtClean="0"/>
-              <a:t> bin/</a:t>
+              <a:t> </a:t>
+            </a:r>
+            <a:r>
+              <a:rPr lang="en-US" sz="2400" dirty="0" smtClean="0"/>
+              <a:t>script/</a:t>
             </a:r>
             <a:r>
               <a:rPr lang="en-US" sz="2400" dirty="0" err="1" smtClean="0"/>
@@ -5440,12 +5455,8 @@
           </a:p>
           <a:p>
             <a:r>
-              <a:rPr lang="en-US" sz="2800" smtClean="0"/>
-              <a:t>From </a:t>
-            </a:r>
-            <a:r>
               <a:rPr lang="en-US" sz="2800" dirty="0" smtClean="0"/>
-              <a:t>the file names you can see which should not validate: error_*</a:t>
+              <a:t>From the file names you can see which should not validate: error_*</a:t>
             </a:r>
           </a:p>
           <a:p>
@@ -5475,7 +5486,7 @@
   <p:timing>
     <p:tnLst>
       <p:par>
-        <p:cTn id="1" dur="indefinite" restart="never" nodeType="tmRoot"/>
+        <p:cTn xmlns:p14="http://schemas.microsoft.com/office/powerpoint/2010/main" id="1" dur="indefinite" restart="never" nodeType="tmRoot"/>
       </p:par>
     </p:tnLst>
   </p:timing>
@@ -5483,7 +5494,7 @@
 </file>
 
 <file path=ppt/slides/slide16.xml><?xml version="1.0" encoding="utf-8"?>
-<p:sld xmlns:a="http://schemas.openxmlformats.org/drawingml/2006/main" xmlns:r="http://schemas.openxmlformats.org/officeDocument/2006/relationships" xmlns:mc="http://schemas.openxmlformats.org/markup-compatibility/2006" xmlns:mv="urn:schemas-microsoft-com:mac:vml" xmlns:p="http://schemas.openxmlformats.org/presentationml/2006/main" mc:Ignorable="mv" mc:PreserveAttributes="mv:*">
+<p:sld xmlns:a="http://schemas.openxmlformats.org/drawingml/2006/main" xmlns:r="http://schemas.openxmlformats.org/officeDocument/2006/relationships" xmlns:p="http://schemas.openxmlformats.org/presentationml/2006/main">
   <p:cSld>
     <p:spTree>
       <p:nvGrpSpPr>
@@ -5560,7 +5571,6 @@
               <a:rPr lang="en-US" dirty="0" smtClean="0"/>
               <a:t> answers_d2s2 origin/answers_d2s2</a:t>
             </a:r>
-            <a:endParaRPr lang="en-US" dirty="0" smtClean="0"/>
           </a:p>
           <a:p>
             <a:pPr>
@@ -5568,19 +5578,11 @@
             </a:pPr>
             <a:r>
               <a:rPr lang="en-US" dirty="0" smtClean="0"/>
-              <a:t>&gt; edit</a:t>
-            </a:r>
-            <a:r>
-              <a:rPr lang="en-US" dirty="0" smtClean="0"/>
-              <a:t>/run </a:t>
+              <a:t>&gt; edit/run </a:t>
             </a:r>
             <a:r>
               <a:rPr lang="en-US" dirty="0" err="1" smtClean="0"/>
-              <a:t>src/</a:t>
-            </a:r>
-            <a:r>
-              <a:rPr lang="en-US" dirty="0" err="1" smtClean="0"/>
-              <a:t>validate_fastqs.sh</a:t>
+              <a:t>src/validate_fastqs.sh</a:t>
             </a:r>
             <a:endParaRPr lang="en-US" dirty="0" smtClean="0"/>
           </a:p>
@@ -5617,7 +5619,7 @@
 </file>
 
 <file path=ppt/slides/slide2.xml><?xml version="1.0" encoding="utf-8"?>
-<p:sld xmlns:a="http://schemas.openxmlformats.org/drawingml/2006/main" xmlns:r="http://schemas.openxmlformats.org/officeDocument/2006/relationships" xmlns:mc="http://schemas.openxmlformats.org/markup-compatibility/2006" xmlns:mv="urn:schemas-microsoft-com:mac:vml" xmlns:p="http://schemas.openxmlformats.org/presentationml/2006/main" mc:Ignorable="mv" mc:PreserveAttributes="mv:*">
+<p:sld xmlns:a="http://schemas.openxmlformats.org/drawingml/2006/main" xmlns:r="http://schemas.openxmlformats.org/officeDocument/2006/relationships" xmlns:p="http://schemas.openxmlformats.org/presentationml/2006/main">
   <p:cSld>
     <p:spTree>
       <p:nvGrpSpPr>
@@ -5707,7 +5709,7 @@
   <p:timing>
     <p:tnLst>
       <p:par>
-        <p:cTn id="1" dur="indefinite" restart="never" nodeType="tmRoot"/>
+        <p:cTn xmlns:p14="http://schemas.microsoft.com/office/powerpoint/2010/main" id="1" dur="indefinite" restart="never" nodeType="tmRoot"/>
       </p:par>
     </p:tnLst>
   </p:timing>
@@ -5715,7 +5717,7 @@
 </file>
 
 <file path=ppt/slides/slide3.xml><?xml version="1.0" encoding="utf-8"?>
-<p:sld xmlns:a="http://schemas.openxmlformats.org/drawingml/2006/main" xmlns:r="http://schemas.openxmlformats.org/officeDocument/2006/relationships" xmlns:mc="http://schemas.openxmlformats.org/markup-compatibility/2006" xmlns:mv="urn:schemas-microsoft-com:mac:vml" xmlns:p="http://schemas.openxmlformats.org/presentationml/2006/main" mc:Ignorable="mv" mc:PreserveAttributes="mv:*">
+<p:sld xmlns:a="http://schemas.openxmlformats.org/drawingml/2006/main" xmlns:r="http://schemas.openxmlformats.org/officeDocument/2006/relationships" xmlns:p="http://schemas.openxmlformats.org/presentationml/2006/main">
   <p:cSld>
     <p:spTree>
       <p:nvGrpSpPr>
@@ -5830,7 +5832,7 @@
   <p:timing>
     <p:tnLst>
       <p:par>
-        <p:cTn id="1" dur="indefinite" restart="never" nodeType="tmRoot"/>
+        <p:cTn xmlns:p14="http://schemas.microsoft.com/office/powerpoint/2010/main" id="1" dur="indefinite" restart="never" nodeType="tmRoot"/>
       </p:par>
     </p:tnLst>
   </p:timing>
@@ -5838,7 +5840,7 @@
 </file>
 
 <file path=ppt/slides/slide4.xml><?xml version="1.0" encoding="utf-8"?>
-<p:sld xmlns:a="http://schemas.openxmlformats.org/drawingml/2006/main" xmlns:r="http://schemas.openxmlformats.org/officeDocument/2006/relationships" xmlns:mc="http://schemas.openxmlformats.org/markup-compatibility/2006" xmlns:mv="urn:schemas-microsoft-com:mac:vml" xmlns:p="http://schemas.openxmlformats.org/presentationml/2006/main" mc:Ignorable="mv" mc:PreserveAttributes="mv:*">
+<p:sld xmlns:a="http://schemas.openxmlformats.org/drawingml/2006/main" xmlns:r="http://schemas.openxmlformats.org/officeDocument/2006/relationships" xmlns:p="http://schemas.openxmlformats.org/presentationml/2006/main">
   <p:cSld>
     <p:spTree>
       <p:nvGrpSpPr>
@@ -5922,7 +5924,7 @@
   <p:timing>
     <p:tnLst>
       <p:par>
-        <p:cTn id="1" dur="indefinite" restart="never" nodeType="tmRoot"/>
+        <p:cTn xmlns:p14="http://schemas.microsoft.com/office/powerpoint/2010/main" id="1" dur="indefinite" restart="never" nodeType="tmRoot"/>
       </p:par>
     </p:tnLst>
   </p:timing>
@@ -5930,7 +5932,7 @@
 </file>
 
 <file path=ppt/slides/slide5.xml><?xml version="1.0" encoding="utf-8"?>
-<p:sld xmlns:a="http://schemas.openxmlformats.org/drawingml/2006/main" xmlns:r="http://schemas.openxmlformats.org/officeDocument/2006/relationships" xmlns:mc="http://schemas.openxmlformats.org/markup-compatibility/2006" xmlns:mv="urn:schemas-microsoft-com:mac:vml" xmlns:p="http://schemas.openxmlformats.org/presentationml/2006/main" mc:Ignorable="mv" mc:PreserveAttributes="mv:*">
+<p:sld xmlns:a="http://schemas.openxmlformats.org/drawingml/2006/main" xmlns:r="http://schemas.openxmlformats.org/officeDocument/2006/relationships" xmlns:p="http://schemas.openxmlformats.org/presentationml/2006/main">
   <p:cSld>
     <p:spTree>
       <p:nvGrpSpPr>
@@ -6022,7 +6024,7 @@
   <p:timing>
     <p:tnLst>
       <p:par>
-        <p:cTn id="1" dur="indefinite" restart="never" nodeType="tmRoot"/>
+        <p:cTn xmlns:p14="http://schemas.microsoft.com/office/powerpoint/2010/main" id="1" dur="indefinite" restart="never" nodeType="tmRoot"/>
       </p:par>
     </p:tnLst>
   </p:timing>
@@ -6030,7 +6032,7 @@
 </file>
 
 <file path=ppt/slides/slide6.xml><?xml version="1.0" encoding="utf-8"?>
-<p:sld xmlns:a="http://schemas.openxmlformats.org/drawingml/2006/main" xmlns:r="http://schemas.openxmlformats.org/officeDocument/2006/relationships" xmlns:mc="http://schemas.openxmlformats.org/markup-compatibility/2006" xmlns:mv="urn:schemas-microsoft-com:mac:vml" xmlns:p="http://schemas.openxmlformats.org/presentationml/2006/main" mc:Ignorable="mv" mc:PreserveAttributes="mv:*">
+<p:sld xmlns:a="http://schemas.openxmlformats.org/drawingml/2006/main" xmlns:r="http://schemas.openxmlformats.org/officeDocument/2006/relationships" xmlns:p="http://schemas.openxmlformats.org/presentationml/2006/main">
   <p:cSld>
     <p:spTree>
       <p:nvGrpSpPr>
@@ -6243,7 +6245,7 @@
   <p:timing>
     <p:tnLst>
       <p:par>
-        <p:cTn id="1" dur="indefinite" restart="never" nodeType="tmRoot"/>
+        <p:cTn xmlns:p14="http://schemas.microsoft.com/office/powerpoint/2010/main" id="1" dur="indefinite" restart="never" nodeType="tmRoot"/>
       </p:par>
     </p:tnLst>
   </p:timing>
@@ -6251,7 +6253,7 @@
 </file>
 
 <file path=ppt/slides/slide7.xml><?xml version="1.0" encoding="utf-8"?>
-<p:sld xmlns:a="http://schemas.openxmlformats.org/drawingml/2006/main" xmlns:r="http://schemas.openxmlformats.org/officeDocument/2006/relationships" xmlns:mc="http://schemas.openxmlformats.org/markup-compatibility/2006" xmlns:mv="urn:schemas-microsoft-com:mac:vml" xmlns:p="http://schemas.openxmlformats.org/presentationml/2006/main" mc:Ignorable="mv" mc:PreserveAttributes="mv:*">
+<p:sld xmlns:a="http://schemas.openxmlformats.org/drawingml/2006/main" xmlns:r="http://schemas.openxmlformats.org/officeDocument/2006/relationships" xmlns:p="http://schemas.openxmlformats.org/presentationml/2006/main">
   <p:cSld>
     <p:spTree>
       <p:nvGrpSpPr>
@@ -6426,7 +6428,7 @@
   <p:timing>
     <p:tnLst>
       <p:par>
-        <p:cTn id="1" dur="indefinite" restart="never" nodeType="tmRoot"/>
+        <p:cTn xmlns:p14="http://schemas.microsoft.com/office/powerpoint/2010/main" id="1" dur="indefinite" restart="never" nodeType="tmRoot"/>
       </p:par>
     </p:tnLst>
   </p:timing>
@@ -6434,7 +6436,7 @@
 </file>
 
 <file path=ppt/slides/slide8.xml><?xml version="1.0" encoding="utf-8"?>
-<p:sld xmlns:a="http://schemas.openxmlformats.org/drawingml/2006/main" xmlns:r="http://schemas.openxmlformats.org/officeDocument/2006/relationships" xmlns:mc="http://schemas.openxmlformats.org/markup-compatibility/2006" xmlns:mv="urn:schemas-microsoft-com:mac:vml" xmlns:p="http://schemas.openxmlformats.org/presentationml/2006/main" mc:Ignorable="mv" mc:PreserveAttributes="mv:*">
+<p:sld xmlns:a="http://schemas.openxmlformats.org/drawingml/2006/main" xmlns:r="http://schemas.openxmlformats.org/officeDocument/2006/relationships" xmlns:p="http://schemas.openxmlformats.org/presentationml/2006/main">
   <p:cSld>
     <p:spTree>
       <p:nvGrpSpPr>
@@ -6699,7 +6701,7 @@
   <p:timing>
     <p:tnLst>
       <p:par>
-        <p:cTn id="1" dur="indefinite" restart="never" nodeType="tmRoot"/>
+        <p:cTn xmlns:p14="http://schemas.microsoft.com/office/powerpoint/2010/main" id="1" dur="indefinite" restart="never" nodeType="tmRoot"/>
       </p:par>
     </p:tnLst>
   </p:timing>
@@ -6707,7 +6709,7 @@
 </file>
 
 <file path=ppt/slides/slide9.xml><?xml version="1.0" encoding="utf-8"?>
-<p:sld xmlns:a="http://schemas.openxmlformats.org/drawingml/2006/main" xmlns:r="http://schemas.openxmlformats.org/officeDocument/2006/relationships" xmlns:mc="http://schemas.openxmlformats.org/markup-compatibility/2006" xmlns:mv="urn:schemas-microsoft-com:mac:vml" xmlns:p="http://schemas.openxmlformats.org/presentationml/2006/main" mc:Ignorable="mv" mc:PreserveAttributes="mv:*">
+<p:sld xmlns:a="http://schemas.openxmlformats.org/drawingml/2006/main" xmlns:r="http://schemas.openxmlformats.org/officeDocument/2006/relationships" xmlns:p="http://schemas.openxmlformats.org/presentationml/2006/main">
   <p:cSld>
     <p:spTree>
       <p:nvGrpSpPr>
@@ -6800,7 +6802,7 @@
   <p:timing>
     <p:tnLst>
       <p:par>
-        <p:cTn id="1" dur="indefinite" restart="never" nodeType="tmRoot"/>
+        <p:cTn xmlns:p14="http://schemas.microsoft.com/office/powerpoint/2010/main" id="1" dur="indefinite" restart="never" nodeType="tmRoot"/>
       </p:par>
     </p:tnLst>
   </p:timing>

</xml_diff>

<commit_message>
renamed 'scripts' directory to 'src' directory to fit ProjectOrg scheme Modified Vagrantfile to mount src instead of script added a results directory to fit ProjectOrg scheme modified src/template.sh to print and store a useful formatted date as an aid for later programming
</commit_message>
<xml_diff>
--- a/doc/slides/day2/session1/CLIScripting.pptx
+++ b/doc/slides/day2/session1/CLIScripting.pptx
@@ -5,7 +5,7 @@
     <p:sldMasterId id="2147483648" r:id="rId1"/>
   </p:sldMasterIdLst>
   <p:notesMasterIdLst>
-    <p:notesMasterId r:id="rId18"/>
+    <p:notesMasterId r:id="rId17"/>
   </p:notesMasterIdLst>
   <p:sldIdLst>
     <p:sldId id="256" r:id="rId2"/>
@@ -23,7 +23,6 @@
     <p:sldId id="266" r:id="rId14"/>
     <p:sldId id="269" r:id="rId15"/>
     <p:sldId id="264" r:id="rId16"/>
-    <p:sldId id="274" r:id="rId17"/>
   </p:sldIdLst>
   <p:sldSz cx="9144000" cy="6858000" type="screen4x3"/>
   <p:notesSz cx="6858000" cy="9144000"/>
@@ -208,7 +207,7 @@
             <a:fld id="{BEBD7BB8-CB0F-3147-8597-AF5DC6013C28}" type="datetimeFigureOut">
               <a:rPr lang="en-US" smtClean="0"/>
               <a:pPr/>
-              <a:t>10/17/13</a:t>
+              <a:t>10/18/13</a:t>
             </a:fld>
             <a:endParaRPr lang="en-US"/>
           </a:p>
@@ -370,7 +369,7 @@
             <a:fld id="{4D83696D-1FDB-3747-BF38-2B83E9AFCFF7}" type="slidenum">
               <a:rPr lang="en-US" smtClean="0"/>
               <a:pPr/>
-              <a:t>‹nr.›</a:t>
+              <a:t>‹#›</a:t>
             </a:fld>
             <a:endParaRPr lang="en-US"/>
           </a:p>
@@ -611,18 +610,6 @@
           </a:bodyPr>
           <a:lstStyle/>
           <a:p>
-            <a:r>
-              <a:rPr lang="en-US" dirty="0" smtClean="0"/>
-              <a:t>Is there a command line program that tests validity</a:t>
-            </a:r>
-            <a:r>
-              <a:rPr lang="en-US" baseline="0" dirty="0" smtClean="0"/>
-              <a:t> of </a:t>
-            </a:r>
-            <a:r>
-              <a:rPr lang="en-US" baseline="0" smtClean="0"/>
-              <a:t>FASTQ files?</a:t>
-            </a:r>
             <a:endParaRPr lang="en-US" dirty="0"/>
           </a:p>
         </p:txBody>
@@ -841,7 +828,7 @@
             <a:fld id="{49072BD6-7320-8A4C-B5BF-960FC4D05047}" type="datetimeFigureOut">
               <a:rPr lang="en-US" smtClean="0"/>
               <a:pPr/>
-              <a:t>10/17/13</a:t>
+              <a:t>10/18/13</a:t>
             </a:fld>
             <a:endParaRPr lang="en-US"/>
           </a:p>
@@ -884,7 +871,7 @@
             <a:fld id="{7E8E7A17-0B47-BE40-9CC8-68FDC404C4A8}" type="slidenum">
               <a:rPr lang="en-US" smtClean="0"/>
               <a:pPr/>
-              <a:t>‹nr.›</a:t>
+              <a:t>‹#›</a:t>
             </a:fld>
             <a:endParaRPr lang="en-US"/>
           </a:p>
@@ -1008,7 +995,7 @@
             <a:fld id="{49072BD6-7320-8A4C-B5BF-960FC4D05047}" type="datetimeFigureOut">
               <a:rPr lang="en-US" smtClean="0"/>
               <a:pPr/>
-              <a:t>10/17/13</a:t>
+              <a:t>10/18/13</a:t>
             </a:fld>
             <a:endParaRPr lang="en-US"/>
           </a:p>
@@ -1051,7 +1038,7 @@
             <a:fld id="{7E8E7A17-0B47-BE40-9CC8-68FDC404C4A8}" type="slidenum">
               <a:rPr lang="en-US" smtClean="0"/>
               <a:pPr/>
-              <a:t>‹nr.›</a:t>
+              <a:t>‹#›</a:t>
             </a:fld>
             <a:endParaRPr lang="en-US"/>
           </a:p>
@@ -1185,7 +1172,7 @@
             <a:fld id="{49072BD6-7320-8A4C-B5BF-960FC4D05047}" type="datetimeFigureOut">
               <a:rPr lang="en-US" smtClean="0"/>
               <a:pPr/>
-              <a:t>10/17/13</a:t>
+              <a:t>10/18/13</a:t>
             </a:fld>
             <a:endParaRPr lang="en-US"/>
           </a:p>
@@ -1228,7 +1215,7 @@
             <a:fld id="{7E8E7A17-0B47-BE40-9CC8-68FDC404C4A8}" type="slidenum">
               <a:rPr lang="en-US" smtClean="0"/>
               <a:pPr/>
-              <a:t>‹nr.›</a:t>
+              <a:t>‹#›</a:t>
             </a:fld>
             <a:endParaRPr lang="en-US"/>
           </a:p>
@@ -1352,7 +1339,7 @@
             <a:fld id="{49072BD6-7320-8A4C-B5BF-960FC4D05047}" type="datetimeFigureOut">
               <a:rPr lang="en-US" smtClean="0"/>
               <a:pPr/>
-              <a:t>10/17/13</a:t>
+              <a:t>10/18/13</a:t>
             </a:fld>
             <a:endParaRPr lang="en-US"/>
           </a:p>
@@ -1395,7 +1382,7 @@
             <a:fld id="{7E8E7A17-0B47-BE40-9CC8-68FDC404C4A8}" type="slidenum">
               <a:rPr lang="en-US" smtClean="0"/>
               <a:pPr/>
-              <a:t>‹nr.›</a:t>
+              <a:t>‹#›</a:t>
             </a:fld>
             <a:endParaRPr lang="en-US"/>
           </a:p>
@@ -1595,7 +1582,7 @@
             <a:fld id="{49072BD6-7320-8A4C-B5BF-960FC4D05047}" type="datetimeFigureOut">
               <a:rPr lang="en-US" smtClean="0"/>
               <a:pPr/>
-              <a:t>10/17/13</a:t>
+              <a:t>10/18/13</a:t>
             </a:fld>
             <a:endParaRPr lang="en-US"/>
           </a:p>
@@ -1638,7 +1625,7 @@
             <a:fld id="{7E8E7A17-0B47-BE40-9CC8-68FDC404C4A8}" type="slidenum">
               <a:rPr lang="en-US" smtClean="0"/>
               <a:pPr/>
-              <a:t>‹nr.›</a:t>
+              <a:t>‹#›</a:t>
             </a:fld>
             <a:endParaRPr lang="en-US"/>
           </a:p>
@@ -1880,7 +1867,7 @@
             <a:fld id="{49072BD6-7320-8A4C-B5BF-960FC4D05047}" type="datetimeFigureOut">
               <a:rPr lang="en-US" smtClean="0"/>
               <a:pPr/>
-              <a:t>10/17/13</a:t>
+              <a:t>10/18/13</a:t>
             </a:fld>
             <a:endParaRPr lang="en-US"/>
           </a:p>
@@ -1923,7 +1910,7 @@
             <a:fld id="{7E8E7A17-0B47-BE40-9CC8-68FDC404C4A8}" type="slidenum">
               <a:rPr lang="en-US" smtClean="0"/>
               <a:pPr/>
-              <a:t>‹nr.›</a:t>
+              <a:t>‹#›</a:t>
             </a:fld>
             <a:endParaRPr lang="en-US"/>
           </a:p>
@@ -2299,7 +2286,7 @@
             <a:fld id="{49072BD6-7320-8A4C-B5BF-960FC4D05047}" type="datetimeFigureOut">
               <a:rPr lang="en-US" smtClean="0"/>
               <a:pPr/>
-              <a:t>10/17/13</a:t>
+              <a:t>10/18/13</a:t>
             </a:fld>
             <a:endParaRPr lang="en-US"/>
           </a:p>
@@ -2342,7 +2329,7 @@
             <a:fld id="{7E8E7A17-0B47-BE40-9CC8-68FDC404C4A8}" type="slidenum">
               <a:rPr lang="en-US" smtClean="0"/>
               <a:pPr/>
-              <a:t>‹nr.›</a:t>
+              <a:t>‹#›</a:t>
             </a:fld>
             <a:endParaRPr lang="en-US"/>
           </a:p>
@@ -2414,7 +2401,7 @@
             <a:fld id="{49072BD6-7320-8A4C-B5BF-960FC4D05047}" type="datetimeFigureOut">
               <a:rPr lang="en-US" smtClean="0"/>
               <a:pPr/>
-              <a:t>10/17/13</a:t>
+              <a:t>10/18/13</a:t>
             </a:fld>
             <a:endParaRPr lang="en-US"/>
           </a:p>
@@ -2457,7 +2444,7 @@
             <a:fld id="{7E8E7A17-0B47-BE40-9CC8-68FDC404C4A8}" type="slidenum">
               <a:rPr lang="en-US" smtClean="0"/>
               <a:pPr/>
-              <a:t>‹nr.›</a:t>
+              <a:t>‹#›</a:t>
             </a:fld>
             <a:endParaRPr lang="en-US"/>
           </a:p>
@@ -2506,7 +2493,7 @@
             <a:fld id="{49072BD6-7320-8A4C-B5BF-960FC4D05047}" type="datetimeFigureOut">
               <a:rPr lang="en-US" smtClean="0"/>
               <a:pPr/>
-              <a:t>10/17/13</a:t>
+              <a:t>10/18/13</a:t>
             </a:fld>
             <a:endParaRPr lang="en-US"/>
           </a:p>
@@ -2549,7 +2536,7 @@
             <a:fld id="{7E8E7A17-0B47-BE40-9CC8-68FDC404C4A8}" type="slidenum">
               <a:rPr lang="en-US" smtClean="0"/>
               <a:pPr/>
-              <a:t>‹nr.›</a:t>
+              <a:t>‹#›</a:t>
             </a:fld>
             <a:endParaRPr lang="en-US"/>
           </a:p>
@@ -2780,7 +2767,7 @@
             <a:fld id="{49072BD6-7320-8A4C-B5BF-960FC4D05047}" type="datetimeFigureOut">
               <a:rPr lang="en-US" smtClean="0"/>
               <a:pPr/>
-              <a:t>10/17/13</a:t>
+              <a:t>10/18/13</a:t>
             </a:fld>
             <a:endParaRPr lang="en-US"/>
           </a:p>
@@ -2823,7 +2810,7 @@
             <a:fld id="{7E8E7A17-0B47-BE40-9CC8-68FDC404C4A8}" type="slidenum">
               <a:rPr lang="en-US" smtClean="0"/>
               <a:pPr/>
-              <a:t>‹nr.›</a:t>
+              <a:t>‹#›</a:t>
             </a:fld>
             <a:endParaRPr lang="en-US"/>
           </a:p>
@@ -3030,7 +3017,7 @@
             <a:fld id="{49072BD6-7320-8A4C-B5BF-960FC4D05047}" type="datetimeFigureOut">
               <a:rPr lang="en-US" smtClean="0"/>
               <a:pPr/>
-              <a:t>10/17/13</a:t>
+              <a:t>10/18/13</a:t>
             </a:fld>
             <a:endParaRPr lang="en-US"/>
           </a:p>
@@ -3073,7 +3060,7 @@
             <a:fld id="{7E8E7A17-0B47-BE40-9CC8-68FDC404C4A8}" type="slidenum">
               <a:rPr lang="en-US" smtClean="0"/>
               <a:pPr/>
-              <a:t>‹nr.›</a:t>
+              <a:t>‹#›</a:t>
             </a:fld>
             <a:endParaRPr lang="en-US"/>
           </a:p>
@@ -3240,7 +3227,7 @@
             <a:fld id="{49072BD6-7320-8A4C-B5BF-960FC4D05047}" type="datetimeFigureOut">
               <a:rPr lang="en-US" smtClean="0"/>
               <a:pPr/>
-              <a:t>10/17/13</a:t>
+              <a:t>10/18/13</a:t>
             </a:fld>
             <a:endParaRPr lang="en-US"/>
           </a:p>
@@ -3319,7 +3306,7 @@
             <a:fld id="{7E8E7A17-0B47-BE40-9CC8-68FDC404C4A8}" type="slidenum">
               <a:rPr lang="en-US" smtClean="0"/>
               <a:pPr/>
-              <a:t>‹nr.›</a:t>
+              <a:t>‹#›</a:t>
             </a:fld>
             <a:endParaRPr lang="en-US"/>
           </a:p>
@@ -4389,14 +4376,7 @@
                 <a:latin typeface="Courier New"/>
                 <a:cs typeface="Courier New"/>
               </a:rPr>
-              <a:t>&gt; </a:t>
-            </a:r>
-            <a:r>
-              <a:rPr lang="en-US" dirty="0" smtClean="0">
-                <a:latin typeface="Courier New"/>
-                <a:cs typeface="Courier New"/>
-              </a:rPr>
-              <a:t>echo $file</a:t>
+              <a:t>&gt; echo $file</a:t>
             </a:r>
             <a:br>
               <a:rPr lang="en-US" dirty="0" smtClean="0">
@@ -4409,14 +4389,7 @@
                 <a:latin typeface="Courier New"/>
                 <a:cs typeface="Courier New"/>
               </a:rPr>
-              <a:t>&gt; </a:t>
-            </a:r>
-            <a:r>
-              <a:rPr lang="en-US" dirty="0" smtClean="0">
-                <a:latin typeface="Courier New"/>
-                <a:cs typeface="Courier New"/>
-              </a:rPr>
-              <a:t>done</a:t>
+              <a:t>&gt; done</a:t>
             </a:r>
           </a:p>
           <a:p>
@@ -5362,7 +5335,19 @@
           <a:p>
             <a:r>
               <a:rPr lang="en-US" dirty="0" smtClean="0"/>
-              <a:t>Exercise: a simple shell script</a:t>
+              <a:t>Exercise: </a:t>
+            </a:r>
+            <a:r>
+              <a:rPr lang="en-US" dirty="0" smtClean="0"/>
+              <a:t>simple </a:t>
+            </a:r>
+            <a:r>
+              <a:rPr lang="en-US" dirty="0" smtClean="0"/>
+              <a:t>shell </a:t>
+            </a:r>
+            <a:r>
+              <a:rPr lang="en-US" dirty="0" smtClean="0"/>
+              <a:t>scripts</a:t>
             </a:r>
             <a:endParaRPr lang="en-US" dirty="0"/>
           </a:p>
@@ -5387,82 +5372,67 @@
           <a:p>
             <a:r>
               <a:rPr lang="en-US" sz="2800" dirty="0" smtClean="0"/>
-              <a:t>Write a simple shell script that: </a:t>
+              <a:t>In Teams, write a script that uses script/</a:t>
+            </a:r>
+            <a:r>
+              <a:rPr lang="en-US" sz="2800" dirty="0" err="1" smtClean="0"/>
+              <a:t>template.sh</a:t>
+            </a:r>
+            <a:r>
+              <a:rPr lang="en-US" sz="2800" dirty="0" smtClean="0"/>
+              <a:t> as a template that:</a:t>
             </a:r>
           </a:p>
           <a:p>
             <a:pPr lvl="1"/>
             <a:r>
+              <a:rPr lang="en-US" sz="2400" dirty="0" err="1" smtClean="0"/>
+              <a:t>TeamA</a:t>
+            </a:r>
+            <a:r>
               <a:rPr lang="en-US" sz="2400" dirty="0" smtClean="0"/>
-              <a:t>uses "</a:t>
+              <a:t>: takes reference and paired raw files (full paths required), tests to make sure reference and raw files exist, and print an error if they do not, then runs the alignment you manually ran </a:t>
+            </a:r>
+            <a:r>
+              <a:rPr lang="en-US" sz="2400" dirty="0" smtClean="0"/>
+              <a:t>on day1 session4 to generate a </a:t>
             </a:r>
             <a:r>
               <a:rPr lang="en-US" sz="2400" dirty="0" err="1" smtClean="0"/>
-              <a:t>perl</a:t>
+              <a:t>sam</a:t>
             </a:r>
             <a:r>
               <a:rPr lang="en-US" sz="2400" dirty="0" smtClean="0"/>
-              <a:t> </a:t>
+              <a:t> file</a:t>
+            </a:r>
+          </a:p>
+          <a:p>
+            <a:pPr lvl="1"/>
+            <a:r>
+              <a:rPr lang="en-US" sz="2400" dirty="0" err="1" smtClean="0"/>
+              <a:t>TeamB</a:t>
             </a:r>
             <a:r>
               <a:rPr lang="en-US" sz="2400" dirty="0" smtClean="0"/>
-              <a:t>script/</a:t>
+              <a:t>: takes reference and </a:t>
             </a:r>
             <a:r>
               <a:rPr lang="en-US" sz="2400" dirty="0" err="1" smtClean="0"/>
-              <a:t>fastqvalidate.pl</a:t>
+              <a:t>sam</a:t>
             </a:r>
             <a:r>
               <a:rPr lang="en-US" sz="2400" dirty="0" smtClean="0"/>
-              <a:t> $file"</a:t>
-            </a:r>
-          </a:p>
-          <a:p>
-            <a:pPr lvl="1"/>
-            <a:r>
-              <a:rPr lang="en-US" sz="2400" dirty="0" smtClean="0"/>
-              <a:t>validates all FASTQ files in the data/</a:t>
-            </a:r>
-            <a:r>
-              <a:rPr lang="en-US" sz="2400" dirty="0" err="1" smtClean="0"/>
-              <a:t>fastq</a:t>
-            </a:r>
-            <a:r>
-              <a:rPr lang="en-US" sz="2400" dirty="0" smtClean="0"/>
-              <a:t> folder</a:t>
-            </a:r>
-          </a:p>
-          <a:p>
-            <a:pPr lvl="1"/>
-            <a:r>
-              <a:rPr lang="en-US" sz="2400" dirty="0" smtClean="0"/>
-              <a:t>prints out the names of invalid files</a:t>
+              <a:t> files, and runs the process to generate consensus sequence you manually ran on day1 session4</a:t>
             </a:r>
           </a:p>
           <a:p>
             <a:r>
               <a:rPr lang="en-US" sz="2800" dirty="0" smtClean="0"/>
-              <a:t>If </a:t>
-            </a:r>
-            <a:r>
-              <a:rPr lang="en-US" sz="2800" dirty="0" err="1" smtClean="0"/>
-              <a:t>fastqvalidate.pl</a:t>
+              <a:t>Bash </a:t>
             </a:r>
             <a:r>
               <a:rPr lang="en-US" sz="2800" dirty="0" smtClean="0"/>
-              <a:t> dies (i.e. invalid file) the exit code $? should be non-zero. Use this.</a:t>
-            </a:r>
-          </a:p>
-          <a:p>
-            <a:r>
-              <a:rPr lang="en-US" sz="2800" dirty="0" smtClean="0"/>
-              <a:t>From the file names you can see which should not validate: error_*</a:t>
-            </a:r>
-          </a:p>
-          <a:p>
-            <a:r>
-              <a:rPr lang="en-US" sz="2800" dirty="0" smtClean="0"/>
-              <a:t>Bash manual: http://</a:t>
+              <a:t>manual: http://</a:t>
             </a:r>
             <a:r>
               <a:rPr lang="en-US" sz="2800" dirty="0" err="1" smtClean="0"/>
@@ -5470,11 +5440,13 @@
             </a:r>
             <a:r>
               <a:rPr lang="en-US" sz="2800" dirty="0" smtClean="0"/>
-              <a:t>/LDP/abs/html/</a:t>
-            </a:r>
-          </a:p>
-          <a:p>
-            <a:endParaRPr lang="en-US" sz="2800" dirty="0"/>
+              <a:t>/LDP/abs/html</a:t>
+            </a:r>
+            <a:r>
+              <a:rPr lang="en-US" sz="2800" dirty="0" smtClean="0"/>
+              <a:t>/</a:t>
+            </a:r>
+            <a:endParaRPr lang="en-US" sz="2800" dirty="0" smtClean="0"/>
           </a:p>
         </p:txBody>
       </p:sp>
@@ -5490,131 +5462,6 @@
       </p:par>
     </p:tnLst>
   </p:timing>
-</p:sld>
-</file>
-
-<file path=ppt/slides/slide16.xml><?xml version="1.0" encoding="utf-8"?>
-<p:sld xmlns:a="http://schemas.openxmlformats.org/drawingml/2006/main" xmlns:r="http://schemas.openxmlformats.org/officeDocument/2006/relationships" xmlns:p="http://schemas.openxmlformats.org/presentationml/2006/main">
-  <p:cSld>
-    <p:spTree>
-      <p:nvGrpSpPr>
-        <p:cNvPr id="1" name=""/>
-        <p:cNvGrpSpPr/>
-        <p:nvPr/>
-      </p:nvGrpSpPr>
-      <p:grpSpPr>
-        <a:xfrm>
-          <a:off x="0" y="0"/>
-          <a:ext cx="0" cy="0"/>
-          <a:chOff x="0" y="0"/>
-          <a:chExt cx="0" cy="0"/>
-        </a:xfrm>
-      </p:grpSpPr>
-      <p:sp>
-        <p:nvSpPr>
-          <p:cNvPr id="2" name="Title 1"/>
-          <p:cNvSpPr>
-            <a:spLocks noGrp="1"/>
-          </p:cNvSpPr>
-          <p:nvPr>
-            <p:ph type="title"/>
-          </p:nvPr>
-        </p:nvSpPr>
-        <p:spPr/>
-        <p:txBody>
-          <a:bodyPr/>
-          <a:lstStyle/>
-          <a:p>
-            <a:r>
-              <a:rPr lang="en-US" dirty="0" smtClean="0"/>
-              <a:t>Answers</a:t>
-            </a:r>
-            <a:endParaRPr lang="en-US" dirty="0"/>
-          </a:p>
-        </p:txBody>
-      </p:sp>
-      <p:sp>
-        <p:nvSpPr>
-          <p:cNvPr id="3" name="Content Placeholder 2"/>
-          <p:cNvSpPr>
-            <a:spLocks noGrp="1"/>
-          </p:cNvSpPr>
-          <p:nvPr>
-            <p:ph idx="1"/>
-          </p:nvPr>
-        </p:nvSpPr>
-        <p:spPr/>
-        <p:txBody>
-          <a:bodyPr/>
-          <a:lstStyle/>
-          <a:p>
-            <a:pPr>
-              <a:buNone/>
-            </a:pPr>
-            <a:r>
-              <a:rPr lang="en-US" dirty="0" smtClean="0"/>
-              <a:t>&gt; </a:t>
-            </a:r>
-            <a:r>
-              <a:rPr lang="en-US" dirty="0" err="1" smtClean="0"/>
-              <a:t>git</a:t>
-            </a:r>
-            <a:r>
-              <a:rPr lang="en-US" dirty="0" smtClean="0"/>
-              <a:t> checkout –</a:t>
-            </a:r>
-            <a:r>
-              <a:rPr lang="en-US" dirty="0" err="1" smtClean="0"/>
-              <a:t>b</a:t>
-            </a:r>
-            <a:r>
-              <a:rPr lang="en-US" dirty="0" smtClean="0"/>
-              <a:t> answers_d2s2 origin/answers_d2s2</a:t>
-            </a:r>
-          </a:p>
-          <a:p>
-            <a:pPr>
-              <a:buNone/>
-            </a:pPr>
-            <a:r>
-              <a:rPr lang="en-US" dirty="0" smtClean="0"/>
-              <a:t>&gt; edit/run </a:t>
-            </a:r>
-            <a:r>
-              <a:rPr lang="en-US" dirty="0" err="1" smtClean="0"/>
-              <a:t>src/validate_fastqs.sh</a:t>
-            </a:r>
-            <a:endParaRPr lang="en-US" dirty="0" smtClean="0"/>
-          </a:p>
-          <a:p>
-            <a:pPr>
-              <a:buNone/>
-            </a:pPr>
-            <a:r>
-              <a:rPr lang="en-US" dirty="0" smtClean="0"/>
-              <a:t>&gt; </a:t>
-            </a:r>
-            <a:r>
-              <a:rPr lang="en-US" dirty="0" err="1" smtClean="0"/>
-              <a:t>git</a:t>
-            </a:r>
-            <a:r>
-              <a:rPr lang="en-US" dirty="0" smtClean="0"/>
-              <a:t> </a:t>
-            </a:r>
-            <a:r>
-              <a:rPr lang="en-US" smtClean="0"/>
-              <a:t>checkout master</a:t>
-            </a:r>
-            <a:endParaRPr lang="en-US" dirty="0"/>
-          </a:p>
-        </p:txBody>
-      </p:sp>
-    </p:spTree>
-  </p:cSld>
-  <p:clrMapOvr>
-    <a:masterClrMapping/>
-  </p:clrMapOvr>
 </p:sld>
 </file>
 

</xml_diff>

<commit_message>
slight tweaks to exercies, and the template bash script
</commit_message>
<xml_diff>
--- a/doc/slides/day2/session1/CLIScripting.pptx
+++ b/doc/slides/day2/session1/CLIScripting.pptx
@@ -207,7 +207,7 @@
             <a:fld id="{BEBD7BB8-CB0F-3147-8597-AF5DC6013C28}" type="datetimeFigureOut">
               <a:rPr lang="en-US" smtClean="0"/>
               <a:pPr/>
-              <a:t>10/18/13</a:t>
+              <a:t>10/22/13</a:t>
             </a:fld>
             <a:endParaRPr lang="en-US"/>
           </a:p>
@@ -828,7 +828,7 @@
             <a:fld id="{49072BD6-7320-8A4C-B5BF-960FC4D05047}" type="datetimeFigureOut">
               <a:rPr lang="en-US" smtClean="0"/>
               <a:pPr/>
-              <a:t>10/18/13</a:t>
+              <a:t>10/22/13</a:t>
             </a:fld>
             <a:endParaRPr lang="en-US"/>
           </a:p>
@@ -995,7 +995,7 @@
             <a:fld id="{49072BD6-7320-8A4C-B5BF-960FC4D05047}" type="datetimeFigureOut">
               <a:rPr lang="en-US" smtClean="0"/>
               <a:pPr/>
-              <a:t>10/18/13</a:t>
+              <a:t>10/22/13</a:t>
             </a:fld>
             <a:endParaRPr lang="en-US"/>
           </a:p>
@@ -1172,7 +1172,7 @@
             <a:fld id="{49072BD6-7320-8A4C-B5BF-960FC4D05047}" type="datetimeFigureOut">
               <a:rPr lang="en-US" smtClean="0"/>
               <a:pPr/>
-              <a:t>10/18/13</a:t>
+              <a:t>10/22/13</a:t>
             </a:fld>
             <a:endParaRPr lang="en-US"/>
           </a:p>
@@ -1339,7 +1339,7 @@
             <a:fld id="{49072BD6-7320-8A4C-B5BF-960FC4D05047}" type="datetimeFigureOut">
               <a:rPr lang="en-US" smtClean="0"/>
               <a:pPr/>
-              <a:t>10/18/13</a:t>
+              <a:t>10/22/13</a:t>
             </a:fld>
             <a:endParaRPr lang="en-US"/>
           </a:p>
@@ -1582,7 +1582,7 @@
             <a:fld id="{49072BD6-7320-8A4C-B5BF-960FC4D05047}" type="datetimeFigureOut">
               <a:rPr lang="en-US" smtClean="0"/>
               <a:pPr/>
-              <a:t>10/18/13</a:t>
+              <a:t>10/22/13</a:t>
             </a:fld>
             <a:endParaRPr lang="en-US"/>
           </a:p>
@@ -1867,7 +1867,7 @@
             <a:fld id="{49072BD6-7320-8A4C-B5BF-960FC4D05047}" type="datetimeFigureOut">
               <a:rPr lang="en-US" smtClean="0"/>
               <a:pPr/>
-              <a:t>10/18/13</a:t>
+              <a:t>10/22/13</a:t>
             </a:fld>
             <a:endParaRPr lang="en-US"/>
           </a:p>
@@ -2286,7 +2286,7 @@
             <a:fld id="{49072BD6-7320-8A4C-B5BF-960FC4D05047}" type="datetimeFigureOut">
               <a:rPr lang="en-US" smtClean="0"/>
               <a:pPr/>
-              <a:t>10/18/13</a:t>
+              <a:t>10/22/13</a:t>
             </a:fld>
             <a:endParaRPr lang="en-US"/>
           </a:p>
@@ -2401,7 +2401,7 @@
             <a:fld id="{49072BD6-7320-8A4C-B5BF-960FC4D05047}" type="datetimeFigureOut">
               <a:rPr lang="en-US" smtClean="0"/>
               <a:pPr/>
-              <a:t>10/18/13</a:t>
+              <a:t>10/22/13</a:t>
             </a:fld>
             <a:endParaRPr lang="en-US"/>
           </a:p>
@@ -2493,7 +2493,7 @@
             <a:fld id="{49072BD6-7320-8A4C-B5BF-960FC4D05047}" type="datetimeFigureOut">
               <a:rPr lang="en-US" smtClean="0"/>
               <a:pPr/>
-              <a:t>10/18/13</a:t>
+              <a:t>10/22/13</a:t>
             </a:fld>
             <a:endParaRPr lang="en-US"/>
           </a:p>
@@ -2767,7 +2767,7 @@
             <a:fld id="{49072BD6-7320-8A4C-B5BF-960FC4D05047}" type="datetimeFigureOut">
               <a:rPr lang="en-US" smtClean="0"/>
               <a:pPr/>
-              <a:t>10/18/13</a:t>
+              <a:t>10/22/13</a:t>
             </a:fld>
             <a:endParaRPr lang="en-US"/>
           </a:p>
@@ -3017,7 +3017,7 @@
             <a:fld id="{49072BD6-7320-8A4C-B5BF-960FC4D05047}" type="datetimeFigureOut">
               <a:rPr lang="en-US" smtClean="0"/>
               <a:pPr/>
-              <a:t>10/18/13</a:t>
+              <a:t>10/22/13</a:t>
             </a:fld>
             <a:endParaRPr lang="en-US"/>
           </a:p>
@@ -3227,7 +3227,7 @@
             <a:fld id="{49072BD6-7320-8A4C-B5BF-960FC4D05047}" type="datetimeFigureOut">
               <a:rPr lang="en-US" smtClean="0"/>
               <a:pPr/>
-              <a:t>10/18/13</a:t>
+              <a:t>10/22/13</a:t>
             </a:fld>
             <a:endParaRPr lang="en-US"/>
           </a:p>
@@ -3621,25 +3621,6 @@
           </a:p>
         </p:txBody>
       </p:sp>
-      <p:sp>
-        <p:nvSpPr>
-          <p:cNvPr id="3" name="Subtitle 2"/>
-          <p:cNvSpPr>
-            <a:spLocks noGrp="1"/>
-          </p:cNvSpPr>
-          <p:nvPr>
-            <p:ph type="subTitle" idx="1"/>
-          </p:nvPr>
-        </p:nvSpPr>
-        <p:spPr/>
-        <p:txBody>
-          <a:bodyPr/>
-          <a:lstStyle/>
-          <a:p>
-            <a:endParaRPr lang="en-US" dirty="0"/>
-          </a:p>
-        </p:txBody>
-      </p:sp>
     </p:spTree>
   </p:cSld>
   <p:clrMapOvr>
@@ -3726,11 +3707,18 @@
               <a:rPr lang="en-US" dirty="0" smtClean="0"/>
             </a:br>
             <a:r>
+              <a:rPr lang="en-US" sz="2800" dirty="0">
+                <a:latin typeface="Courier New"/>
+                <a:cs typeface="Courier New"/>
+              </a:rPr>
+              <a:t>&gt;</a:t>
+            </a:r>
+            <a:r>
               <a:rPr lang="en-US" sz="2800" dirty="0" smtClean="0">
                 <a:latin typeface="Courier New"/>
                 <a:cs typeface="Courier New"/>
               </a:rPr>
-              <a:t>$ </a:t>
+              <a:t> </a:t>
             </a:r>
             <a:r>
               <a:rPr lang="en-US" sz="2800" dirty="0" err="1" smtClean="0">
@@ -3855,11 +3843,18 @@
               <a:rPr lang="en-US" dirty="0" smtClean="0"/>
             </a:br>
             <a:r>
+              <a:rPr lang="en-US" sz="2400" dirty="0">
+                <a:latin typeface="Courier New"/>
+                <a:cs typeface="Courier New"/>
+              </a:rPr>
+              <a:t>&gt;</a:t>
+            </a:r>
+            <a:r>
               <a:rPr lang="en-US" sz="2400" dirty="0" smtClean="0">
                 <a:latin typeface="Courier New"/>
                 <a:cs typeface="Courier New"/>
               </a:rPr>
-              <a:t>$ </a:t>
+              <a:t> </a:t>
             </a:r>
             <a:r>
               <a:rPr lang="en-US" sz="2400" dirty="0" err="1" smtClean="0">
@@ -3880,14 +3875,7 @@
                 <a:latin typeface="Courier New"/>
                 <a:cs typeface="Courier New"/>
               </a:rPr>
-              <a:t>ls</a:t>
-            </a:r>
-            <a:r>
-              <a:rPr lang="en-US" sz="2400" dirty="0" smtClean="0">
-                <a:latin typeface="Courier New"/>
-                <a:cs typeface="Courier New"/>
-              </a:rPr>
-              <a:t>`</a:t>
+              <a:t>ls`</a:t>
             </a:r>
             <a:endParaRPr lang="en-US" dirty="0" smtClean="0">
               <a:latin typeface="Courier New"/>
@@ -3911,11 +3899,18 @@
               <a:rPr lang="en-US" dirty="0" smtClean="0"/>
             </a:br>
             <a:r>
+              <a:rPr lang="en-US" sz="2400" dirty="0">
+                <a:latin typeface="Courier New"/>
+                <a:cs typeface="Courier New"/>
+              </a:rPr>
+              <a:t>&gt;</a:t>
+            </a:r>
+            <a:r>
               <a:rPr lang="en-US" sz="2400" dirty="0" smtClean="0">
                 <a:latin typeface="Courier New"/>
                 <a:cs typeface="Courier New"/>
               </a:rPr>
-              <a:t>$ </a:t>
+              <a:t> </a:t>
             </a:r>
             <a:r>
               <a:rPr lang="en-US" sz="2400" dirty="0" err="1" smtClean="0">
@@ -3957,21 +3952,7 @@
                 <a:latin typeface="Courier New"/>
                 <a:cs typeface="Courier New"/>
               </a:rPr>
-              <a:t> -</a:t>
-            </a:r>
-            <a:r>
-              <a:rPr lang="en-US" sz="2400" dirty="0" err="1" smtClean="0">
-                <a:latin typeface="Courier New"/>
-                <a:cs typeface="Courier New"/>
-              </a:rPr>
-              <a:t>v</a:t>
-            </a:r>
-            <a:r>
-              <a:rPr lang="en-US" sz="2400" dirty="0" smtClean="0">
-                <a:latin typeface="Courier New"/>
-                <a:cs typeface="Courier New"/>
-              </a:rPr>
-              <a:t> '</a:t>
+              <a:t> -v '</a:t>
             </a:r>
             <a:r>
               <a:rPr lang="en-US" sz="2400" dirty="0" err="1" smtClean="0">
@@ -4005,11 +3986,18 @@
               <a:rPr lang="en-US" dirty="0" smtClean="0"/>
             </a:br>
             <a:r>
+              <a:rPr lang="en-US" sz="2400" dirty="0">
+                <a:latin typeface="Courier New"/>
+                <a:cs typeface="Courier New"/>
+              </a:rPr>
+              <a:t>&gt;</a:t>
+            </a:r>
+            <a:r>
               <a:rPr lang="en-US" sz="2400" dirty="0" smtClean="0">
                 <a:latin typeface="Courier New"/>
                 <a:cs typeface="Courier New"/>
               </a:rPr>
-              <a:t>$ </a:t>
+              <a:t> </a:t>
             </a:r>
             <a:r>
               <a:rPr lang="en-US" sz="2400" dirty="0" err="1" smtClean="0">
@@ -4051,21 +4039,7 @@
                 <a:latin typeface="Courier New"/>
                 <a:cs typeface="Courier New"/>
               </a:rPr>
-              <a:t> -</a:t>
-            </a:r>
-            <a:r>
-              <a:rPr lang="en-US" sz="2400" dirty="0" err="1" smtClean="0">
-                <a:latin typeface="Courier New"/>
-                <a:cs typeface="Courier New"/>
-              </a:rPr>
-              <a:t>v</a:t>
-            </a:r>
-            <a:r>
-              <a:rPr lang="en-US" sz="2400" dirty="0" smtClean="0">
-                <a:latin typeface="Courier New"/>
-                <a:cs typeface="Courier New"/>
-              </a:rPr>
-              <a:t> '</a:t>
+              <a:t> -v '</a:t>
             </a:r>
             <a:r>
               <a:rPr lang="en-US" sz="2400" dirty="0" err="1" smtClean="0">
@@ -4166,25 +4140,25 @@
               <a:rPr lang="en-US" dirty="0" smtClean="0"/>
             </a:br>
             <a:r>
+              <a:rPr lang="en-US" dirty="0">
+                <a:latin typeface="Courier New"/>
+                <a:cs typeface="Courier New"/>
+              </a:rPr>
+              <a:t>&gt;</a:t>
+            </a:r>
+            <a:r>
               <a:rPr lang="en-US" dirty="0" smtClean="0">
                 <a:latin typeface="Courier New"/>
                 <a:cs typeface="Courier New"/>
               </a:rPr>
-              <a:t>$ if [ ! -</a:t>
-            </a:r>
-            <a:r>
-              <a:rPr lang="en-US" dirty="0" err="1" smtClean="0">
-                <a:latin typeface="Courier New"/>
-                <a:cs typeface="Courier New"/>
-              </a:rPr>
-              <a:t>e</a:t>
+              <a:t> </a:t>
             </a:r>
             <a:r>
               <a:rPr lang="en-US" dirty="0" smtClean="0">
                 <a:latin typeface="Courier New"/>
                 <a:cs typeface="Courier New"/>
               </a:rPr>
-              <a:t> "filename" ]; then</a:t>
+              <a:t>if [ ! -e "filename" ]; then</a:t>
             </a:r>
             <a:br>
               <a:rPr lang="en-US" dirty="0" smtClean="0">
@@ -4197,7 +4171,14 @@
                 <a:latin typeface="Courier New"/>
                 <a:cs typeface="Courier New"/>
               </a:rPr>
-              <a:t>$ touch filename</a:t>
+              <a:t>&gt; </a:t>
+            </a:r>
+            <a:r>
+              <a:rPr lang="en-US" dirty="0" smtClean="0">
+                <a:latin typeface="Courier New"/>
+                <a:cs typeface="Courier New"/>
+              </a:rPr>
+              <a:t>touch filename</a:t>
             </a:r>
             <a:br>
               <a:rPr lang="en-US" dirty="0" smtClean="0">
@@ -4210,10 +4191,10 @@
                 <a:latin typeface="Courier New"/>
                 <a:cs typeface="Courier New"/>
               </a:rPr>
-              <a:t>$ </a:t>
-            </a:r>
-            <a:r>
-              <a:rPr lang="en-US" dirty="0" err="1" smtClean="0">
+              <a:t>&gt; </a:t>
+            </a:r>
+            <a:r>
+              <a:rPr lang="en-US" dirty="0" smtClean="0">
                 <a:latin typeface="Courier New"/>
                 <a:cs typeface="Courier New"/>
               </a:rPr>
@@ -4304,11 +4285,18 @@
               <a:rPr lang="en-US" dirty="0" smtClean="0"/>
             </a:br>
             <a:r>
+              <a:rPr lang="en-US" dirty="0">
+                <a:latin typeface="Courier New"/>
+                <a:cs typeface="Courier New"/>
+              </a:rPr>
+              <a:t>&gt;</a:t>
+            </a:r>
+            <a:r>
               <a:rPr lang="en-US" dirty="0" smtClean="0">
                 <a:latin typeface="Courier New"/>
                 <a:cs typeface="Courier New"/>
               </a:rPr>
-              <a:t>$ </a:t>
+              <a:t> </a:t>
             </a:r>
             <a:r>
               <a:rPr lang="en-US" dirty="0" err="1" smtClean="0">
@@ -4349,7 +4337,14 @@
                 <a:latin typeface="Courier New"/>
                 <a:cs typeface="Courier New"/>
               </a:rPr>
-              <a:t>$ for file in $</a:t>
+              <a:t>&gt; </a:t>
+            </a:r>
+            <a:r>
+              <a:rPr lang="en-US" dirty="0" smtClean="0">
+                <a:latin typeface="Courier New"/>
+                <a:cs typeface="Courier New"/>
+              </a:rPr>
+              <a:t>for file in $</a:t>
             </a:r>
             <a:r>
               <a:rPr lang="en-US" dirty="0" err="1" smtClean="0">
@@ -4376,7 +4371,14 @@
                 <a:latin typeface="Courier New"/>
                 <a:cs typeface="Courier New"/>
               </a:rPr>
-              <a:t>&gt; echo $file</a:t>
+              <a:t>&gt; </a:t>
+            </a:r>
+            <a:r>
+              <a:rPr lang="en-US" dirty="0" smtClean="0">
+                <a:latin typeface="Courier New"/>
+                <a:cs typeface="Courier New"/>
+              </a:rPr>
+              <a:t>echo $file</a:t>
             </a:r>
             <a:br>
               <a:rPr lang="en-US" dirty="0" smtClean="0">
@@ -5335,19 +5337,7 @@
           <a:p>
             <a:r>
               <a:rPr lang="en-US" dirty="0" smtClean="0"/>
-              <a:t>Exercise: </a:t>
-            </a:r>
-            <a:r>
-              <a:rPr lang="en-US" dirty="0" smtClean="0"/>
-              <a:t>simple </a:t>
-            </a:r>
-            <a:r>
-              <a:rPr lang="en-US" dirty="0" smtClean="0"/>
-              <a:t>shell </a:t>
-            </a:r>
-            <a:r>
-              <a:rPr lang="en-US" dirty="0" smtClean="0"/>
-              <a:t>scripts</a:t>
+              <a:t>Exercise: simple shell scripts</a:t>
             </a:r>
             <a:endParaRPr lang="en-US" dirty="0"/>
           </a:p>
@@ -5366,13 +5356,21 @@
         <p:spPr/>
         <p:txBody>
           <a:bodyPr>
-            <a:normAutofit/>
+            <a:normAutofit fontScale="85000" lnSpcReduction="20000"/>
           </a:bodyPr>
           <a:lstStyle/>
           <a:p>
             <a:r>
               <a:rPr lang="en-US" sz="2800" dirty="0" smtClean="0"/>
-              <a:t>In Teams, write a script that uses script/</a:t>
+              <a:t>In Teams, write a </a:t>
+            </a:r>
+            <a:r>
+              <a:rPr lang="en-US" sz="2800" dirty="0" smtClean="0"/>
+              <a:t>bash script </a:t>
+            </a:r>
+            <a:r>
+              <a:rPr lang="en-US" sz="2800" dirty="0" smtClean="0"/>
+              <a:t>that uses script/</a:t>
             </a:r>
             <a:r>
               <a:rPr lang="en-US" sz="2800" dirty="0" err="1" smtClean="0"/>
@@ -5391,11 +5389,7 @@
             </a:r>
             <a:r>
               <a:rPr lang="en-US" sz="2400" dirty="0" smtClean="0"/>
-              <a:t>: takes reference and paired raw files (full paths required), tests to make sure reference and raw files exist, and print an error if they do not, then runs the alignment you manually ran </a:t>
-            </a:r>
-            <a:r>
-              <a:rPr lang="en-US" sz="2400" dirty="0" smtClean="0"/>
-              <a:t>on day1 session4 to generate a </a:t>
+              <a:t>: takes reference and paired raw files (full paths required), tests to make sure reference and raw files exist, and print an error if they do not, then runs the alignment you manually ran on day1 session4 to generate a </a:t>
             </a:r>
             <a:r>
               <a:rPr lang="en-US" sz="2400" dirty="0" err="1" smtClean="0"/>
@@ -5403,8 +5397,73 @@
             </a:r>
             <a:r>
               <a:rPr lang="en-US" sz="2400" dirty="0" smtClean="0"/>
-              <a:t> file</a:t>
-            </a:r>
+              <a:t> </a:t>
+            </a:r>
+            <a:r>
+              <a:rPr lang="en-US" sz="2400" dirty="0" smtClean="0"/>
+              <a:t>file named </a:t>
+            </a:r>
+            <a:r>
+              <a:rPr lang="en-US" sz="2400" dirty="0" err="1" smtClean="0"/>
+              <a:t>all_reads.sam</a:t>
+            </a:r>
+            <a:endParaRPr lang="en-US" sz="2400" dirty="0" smtClean="0"/>
+          </a:p>
+          <a:p>
+            <a:pPr lvl="2"/>
+            <a:r>
+              <a:rPr lang="en-US" sz="2000" dirty="0" smtClean="0"/>
+              <a:t>Usage:</a:t>
+            </a:r>
+            <a:r>
+              <a:rPr lang="en-US" sz="2000" dirty="0" smtClean="0"/>
+              <a:t> </a:t>
+            </a:r>
+            <a:r>
+              <a:rPr lang="en-US" sz="2000" dirty="0" err="1" smtClean="0"/>
+              <a:t>team_a</a:t>
+            </a:r>
+            <a:r>
+              <a:rPr lang="en-US" sz="2000" dirty="0" err="1" smtClean="0"/>
+              <a:t>_script.bash</a:t>
+            </a:r>
+            <a:r>
+              <a:rPr lang="en-US" sz="2000" dirty="0" smtClean="0"/>
+              <a:t> </a:t>
+            </a:r>
+            <a:r>
+              <a:rPr lang="en-US" sz="2000" dirty="0" err="1" smtClean="0"/>
+              <a:t>path_to_reference</a:t>
+            </a:r>
+            <a:r>
+              <a:rPr lang="en-US" sz="2000" dirty="0" smtClean="0"/>
+              <a:t> </a:t>
+            </a:r>
+            <a:r>
+              <a:rPr lang="en-US" sz="2000" dirty="0" err="1" smtClean="0"/>
+              <a:t>path_to_pair_one</a:t>
+            </a:r>
+            <a:r>
+              <a:rPr lang="en-US" sz="2000" dirty="0" smtClean="0"/>
+              <a:t> </a:t>
+            </a:r>
+            <a:r>
+              <a:rPr lang="en-US" sz="2000" dirty="0" err="1" smtClean="0"/>
+              <a:t>path_to_pair_two</a:t>
+            </a:r>
+            <a:endParaRPr lang="en-US" sz="2000" dirty="0" smtClean="0"/>
+          </a:p>
+          <a:p>
+            <a:pPr lvl="2"/>
+            <a:r>
+              <a:rPr lang="en-US" sz="2000" dirty="0" smtClean="0"/>
+              <a:t>Produces </a:t>
+            </a:r>
+            <a:r>
+              <a:rPr lang="en-US" sz="2000" dirty="0" err="1" smtClean="0"/>
+              <a:t>all_reads.sam</a:t>
+            </a:r>
+            <a:endParaRPr lang="en-US" sz="2000" dirty="0" smtClean="0"/>
           </a:p>
           <a:p>
             <a:pPr lvl="1"/>
@@ -5414,25 +5473,98 @@
             </a:r>
             <a:r>
               <a:rPr lang="en-US" sz="2400" dirty="0" smtClean="0"/>
-              <a:t>: takes reference and </a:t>
+              <a:t>: </a:t>
+            </a:r>
+            <a:r>
+              <a:rPr lang="en-US" sz="2400" dirty="0" smtClean="0"/>
+              <a:t>takes the </a:t>
             </a:r>
             <a:r>
               <a:rPr lang="en-US" sz="2400" dirty="0" err="1" smtClean="0"/>
-              <a:t>sam</a:t>
+              <a:t>all_reads.sam</a:t>
             </a:r>
             <a:r>
               <a:rPr lang="en-US" sz="2400" dirty="0" smtClean="0"/>
-              <a:t> files, and runs the process to generate consensus sequence you manually ran on day1 session4</a:t>
-            </a:r>
+              <a:t> file produced by </a:t>
+            </a:r>
+            <a:r>
+              <a:rPr lang="en-US" sz="2400" dirty="0" err="1" smtClean="0"/>
+              <a:t>team_a_script.bash</a:t>
+            </a:r>
+            <a:r>
+              <a:rPr lang="en-US" sz="2400" dirty="0" smtClean="0"/>
+              <a:t>, </a:t>
+            </a:r>
+            <a:r>
+              <a:rPr lang="en-US" sz="2400" dirty="0" smtClean="0"/>
+              <a:t>and </a:t>
+            </a:r>
+            <a:r>
+              <a:rPr lang="en-US" sz="2400" dirty="0" smtClean="0"/>
+              <a:t>produces two sorted bam files named </a:t>
+            </a:r>
+            <a:r>
+              <a:rPr lang="en-US" sz="2400" dirty="0" err="1" smtClean="0"/>
+              <a:t>aligned_reads.bam</a:t>
+            </a:r>
+            <a:r>
+              <a:rPr lang="en-US" sz="2400" dirty="0" smtClean="0"/>
+              <a:t> and </a:t>
+            </a:r>
+            <a:r>
+              <a:rPr lang="en-US" sz="2400" dirty="0" err="1" smtClean="0"/>
+              <a:t>unaligned_reads.bam</a:t>
+            </a:r>
+            <a:endParaRPr lang="en-US" sz="2400" dirty="0"/>
+          </a:p>
+          <a:p>
+            <a:pPr lvl="2"/>
+            <a:r>
+              <a:rPr lang="en-US" sz="2000" dirty="0" smtClean="0"/>
+              <a:t>Usage: </a:t>
+            </a:r>
+            <a:r>
+              <a:rPr lang="en-US" sz="2000" dirty="0" err="1" smtClean="0"/>
+              <a:t>team_b_script</a:t>
+            </a:r>
+            <a:r>
+              <a:rPr lang="en-US" sz="2000" dirty="0" err="1" smtClean="0"/>
+              <a:t>.bash</a:t>
+            </a:r>
+            <a:r>
+              <a:rPr lang="en-US" sz="2000" dirty="0" smtClean="0"/>
+              <a:t> </a:t>
+            </a:r>
+            <a:r>
+              <a:rPr lang="en-US" sz="2000" dirty="0" err="1" smtClean="0"/>
+              <a:t>path_to_sam</a:t>
+            </a:r>
+            <a:endParaRPr lang="en-US" sz="2000" dirty="0" smtClean="0"/>
+          </a:p>
+          <a:p>
+            <a:pPr lvl="2"/>
+            <a:r>
+              <a:rPr lang="en-US" sz="2000" dirty="0" smtClean="0"/>
+              <a:t>Produces (sorted): </a:t>
+            </a:r>
+            <a:r>
+              <a:rPr lang="en-US" sz="2000" dirty="0" err="1" smtClean="0"/>
+              <a:t>aligned_reads.bam</a:t>
+            </a:r>
+            <a:r>
+              <a:rPr lang="en-US" sz="2000" dirty="0" smtClean="0"/>
+              <a:t>, </a:t>
+            </a:r>
+            <a:r>
+              <a:rPr lang="en-US" sz="2000" dirty="0" err="1" smtClean="0"/>
+              <a:t>unaligned_reads.bam</a:t>
+            </a:r>
+            <a:endParaRPr lang="en-US" sz="2000" dirty="0" smtClean="0"/>
           </a:p>
           <a:p>
             <a:r>
               <a:rPr lang="en-US" sz="2800" dirty="0" smtClean="0"/>
-              <a:t>Bash </a:t>
-            </a:r>
-            <a:r>
-              <a:rPr lang="en-US" sz="2800" dirty="0" smtClean="0"/>
-              <a:t>manual: http://</a:t>
+              <a:t>Bash manual: http://</a:t>
             </a:r>
             <a:r>
               <a:rPr lang="en-US" sz="2800" dirty="0" err="1" smtClean="0"/>
@@ -5440,13 +5572,8 @@
             </a:r>
             <a:r>
               <a:rPr lang="en-US" sz="2800" dirty="0" smtClean="0"/>
-              <a:t>/LDP/abs/html</a:t>
-            </a:r>
-            <a:r>
-              <a:rPr lang="en-US" sz="2800" dirty="0" smtClean="0"/>
-              <a:t>/</a:t>
-            </a:r>
-            <a:endParaRPr lang="en-US" sz="2800" dirty="0" smtClean="0"/>
+              <a:t>/LDP/abs/html/</a:t>
+            </a:r>
           </a:p>
         </p:txBody>
       </p:sp>
@@ -5943,11 +6070,18 @@
               <a:rPr lang="en-US" dirty="0" smtClean="0"/>
             </a:br>
             <a:r>
+              <a:rPr lang="en-US" dirty="0">
+                <a:latin typeface="Courier New"/>
+                <a:cs typeface="Courier New"/>
+              </a:rPr>
+              <a:t>&gt;</a:t>
+            </a:r>
+            <a:r>
               <a:rPr lang="en-US" dirty="0" smtClean="0">
                 <a:latin typeface="Courier New"/>
                 <a:cs typeface="Courier New"/>
               </a:rPr>
-              <a:t>$ </a:t>
+              <a:t> </a:t>
             </a:r>
             <a:r>
               <a:rPr lang="en-US" dirty="0" err="1" smtClean="0">
@@ -5984,11 +6118,18 @@
               <a:rPr lang="en-US" dirty="0" smtClean="0"/>
             </a:br>
             <a:r>
+              <a:rPr lang="en-US" dirty="0">
+                <a:latin typeface="Courier New"/>
+                <a:cs typeface="Courier New"/>
+              </a:rPr>
+              <a:t>&gt;</a:t>
+            </a:r>
+            <a:r>
               <a:rPr lang="en-US" dirty="0" smtClean="0">
                 <a:latin typeface="Courier New"/>
                 <a:cs typeface="Courier New"/>
               </a:rPr>
-              <a:t>$ </a:t>
+              <a:t> </a:t>
             </a:r>
             <a:r>
               <a:rPr lang="en-US" dirty="0" err="1" smtClean="0">
@@ -6002,35 +6143,7 @@
                 <a:latin typeface="Courier New"/>
                 <a:cs typeface="Courier New"/>
               </a:rPr>
-              <a:t> </a:t>
-            </a:r>
-            <a:r>
-              <a:rPr lang="en-US" dirty="0" err="1" smtClean="0">
-                <a:latin typeface="Courier New"/>
-                <a:cs typeface="Courier New"/>
-              </a:rPr>
-              <a:t>u</a:t>
-            </a:r>
-            <a:r>
-              <a:rPr lang="en-US" dirty="0" smtClean="0">
-                <a:latin typeface="Courier New"/>
-                <a:cs typeface="Courier New"/>
-              </a:rPr>
-              <a:t>=+</a:t>
-            </a:r>
-            <a:r>
-              <a:rPr lang="en-US" dirty="0" err="1" smtClean="0">
-                <a:latin typeface="Courier New"/>
-                <a:cs typeface="Courier New"/>
-              </a:rPr>
-              <a:t>x</a:t>
-            </a:r>
-            <a:r>
-              <a:rPr lang="en-US" dirty="0" smtClean="0">
-                <a:latin typeface="Courier New"/>
-                <a:cs typeface="Courier New"/>
-              </a:rPr>
-              <a:t> </a:t>
+              <a:t> u=+x </a:t>
             </a:r>
             <a:r>
               <a:rPr lang="en-US" dirty="0" err="1" smtClean="0">
@@ -6057,7 +6170,14 @@
                 <a:latin typeface="Courier New"/>
                 <a:cs typeface="Courier New"/>
               </a:rPr>
-              <a:t>$ ./</a:t>
+              <a:t>&gt; </a:t>
+            </a:r>
+            <a:r>
+              <a:rPr lang="en-US" dirty="0" smtClean="0">
+                <a:latin typeface="Courier New"/>
+                <a:cs typeface="Courier New"/>
+              </a:rPr>
+              <a:t>./</a:t>
             </a:r>
             <a:r>
               <a:rPr lang="en-US" dirty="0" err="1" smtClean="0">
@@ -6132,8 +6252,20 @@
           <a:lstStyle/>
           <a:p>
             <a:r>
+              <a:rPr lang="en-US" dirty="0" err="1" smtClean="0"/>
+              <a:t>Hash</a:t>
+            </a:r>
+            <a:r>
+              <a:rPr lang="en-US" dirty="0" err="1" smtClean="0"/>
+              <a:t>bang</a:t>
+            </a:r>
+            <a:r>
               <a:rPr lang="en-US" dirty="0" smtClean="0"/>
-              <a:t>Shebang line</a:t>
+              <a:t> </a:t>
+            </a:r>
+            <a:r>
+              <a:rPr lang="en-US" dirty="0" smtClean="0"/>
+              <a:t>line</a:t>
             </a:r>
             <a:endParaRPr lang="en-US" dirty="0"/>
           </a:p>
@@ -6198,7 +6330,19 @@
               <a:rPr lang="en-US" dirty="0" smtClean="0">
                 <a:cs typeface="Courier New"/>
               </a:rPr>
-              <a:t>When such a script is executed, the operating system will pass the script to the interpreter in the shebang, i.e.:</a:t>
+              <a:t>When such a script is executed, the operating system will pass the script to the interpreter in the </a:t>
+            </a:r>
+            <a:r>
+              <a:rPr lang="en-US" dirty="0" err="1" smtClean="0">
+                <a:cs typeface="Courier New"/>
+              </a:rPr>
+              <a:t>hashbang</a:t>
+            </a:r>
+            <a:r>
+              <a:rPr lang="en-US" dirty="0" smtClean="0">
+                <a:cs typeface="Courier New"/>
+              </a:rPr>
+              <a:t>, i.e.:</a:t>
             </a:r>
             <a:br>
               <a:rPr lang="en-US" dirty="0" smtClean="0">
@@ -6356,16 +6500,22 @@
             </a:r>
           </a:p>
           <a:p>
-            <a:pPr>
-              <a:buFont typeface="Lucida Grande"/>
-              <a:buChar char="$"/>
+            <a:pPr marL="0" indent="0">
+              <a:buNone/>
             </a:pPr>
             <a:r>
               <a:rPr lang="en-US" sz="2400" dirty="0" smtClean="0">
                 <a:latin typeface="Courier New"/>
                 <a:cs typeface="Courier New"/>
               </a:rPr>
-              <a:t>echo '#!/bin/</a:t>
+              <a:t>&gt; echo </a:t>
+            </a:r>
+            <a:r>
+              <a:rPr lang="en-US" sz="2400" dirty="0" smtClean="0">
+                <a:latin typeface="Courier New"/>
+                <a:cs typeface="Courier New"/>
+              </a:rPr>
+              <a:t>'#!/bin/</a:t>
             </a:r>
             <a:r>
               <a:rPr lang="en-US" sz="2400" dirty="0" err="1" smtClean="0">
@@ -6394,16 +6544,22 @@
             </a:endParaRPr>
           </a:p>
           <a:p>
-            <a:pPr>
-              <a:buFont typeface="Lucida Grande"/>
-              <a:buChar char="$"/>
+            <a:pPr marL="0" indent="0">
+              <a:buNone/>
             </a:pPr>
             <a:r>
               <a:rPr lang="en-US" sz="2400" dirty="0" smtClean="0">
                 <a:latin typeface="Courier New"/>
                 <a:cs typeface="Courier New"/>
               </a:rPr>
-              <a:t>echo 'echo "Hello World!"' &gt;&gt; </a:t>
+              <a:t>&gt; echo </a:t>
+            </a:r>
+            <a:r>
+              <a:rPr lang="en-US" sz="2400" dirty="0" smtClean="0">
+                <a:latin typeface="Courier New"/>
+                <a:cs typeface="Courier New"/>
+              </a:rPr>
+              <a:t>'echo "Hello World!"' &gt;&gt; </a:t>
             </a:r>
             <a:r>
               <a:rPr lang="en-US" sz="2400" dirty="0" err="1" smtClean="0">
@@ -6418,16 +6574,22 @@
             </a:endParaRPr>
           </a:p>
           <a:p>
-            <a:pPr>
-              <a:buFont typeface="Lucida Grande"/>
-              <a:buChar char="$"/>
+            <a:pPr marL="0" indent="0">
+              <a:buNone/>
             </a:pPr>
             <a:r>
               <a:rPr lang="en-US" sz="2400" dirty="0" smtClean="0">
                 <a:latin typeface="Courier New"/>
                 <a:cs typeface="Courier New"/>
               </a:rPr>
-              <a:t>echo '</a:t>
+              <a:t>&gt; echo </a:t>
+            </a:r>
+            <a:r>
+              <a:rPr lang="en-US" sz="2400" dirty="0" smtClean="0">
+                <a:latin typeface="Courier New"/>
+                <a:cs typeface="Courier New"/>
+              </a:rPr>
+              <a:t>'</a:t>
             </a:r>
             <a:r>
               <a:rPr lang="en-US" sz="2400" dirty="0" err="1" smtClean="0">
@@ -6456,11 +6618,17 @@
             </a:endParaRPr>
           </a:p>
           <a:p>
-            <a:pPr>
-              <a:buFont typeface="Lucida Grande"/>
-              <a:buChar char="$"/>
+            <a:pPr marL="0" indent="0">
+              <a:buNone/>
             </a:pPr>
             <a:r>
+              <a:rPr lang="en-US" sz="2400" dirty="0" smtClean="0">
+                <a:latin typeface="Courier New"/>
+                <a:cs typeface="Courier New"/>
+              </a:rPr>
+              <a:t>&gt; </a:t>
+            </a:r>
+            <a:r>
               <a:rPr lang="en-US" sz="2400" dirty="0" err="1" smtClean="0">
                 <a:latin typeface="Courier New"/>
                 <a:cs typeface="Courier New"/>
@@ -6475,32 +6643,11 @@
               <a:t> </a:t>
             </a:r>
             <a:r>
-              <a:rPr lang="en-US" sz="2400" dirty="0" err="1" smtClean="0">
-                <a:latin typeface="Courier New"/>
-                <a:cs typeface="Courier New"/>
-              </a:rPr>
-              <a:t>u</a:t>
-            </a:r>
-            <a:r>
               <a:rPr lang="en-US" sz="2400" dirty="0" smtClean="0">
                 <a:latin typeface="Courier New"/>
                 <a:cs typeface="Courier New"/>
               </a:rPr>
-              <a:t>=+</a:t>
-            </a:r>
-            <a:r>
-              <a:rPr lang="en-US" sz="2400" dirty="0" err="1" smtClean="0">
-                <a:latin typeface="Courier New"/>
-                <a:cs typeface="Courier New"/>
-              </a:rPr>
-              <a:t>x</a:t>
-            </a:r>
-            <a:r>
-              <a:rPr lang="en-US" sz="2400" dirty="0" smtClean="0">
-                <a:latin typeface="Courier New"/>
-                <a:cs typeface="Courier New"/>
-              </a:rPr>
-              <a:t> </a:t>
+              <a:t>u=+x </a:t>
             </a:r>
             <a:r>
               <a:rPr lang="en-US" sz="2400" dirty="0" err="1" smtClean="0">
@@ -6515,16 +6662,22 @@
             </a:endParaRPr>
           </a:p>
           <a:p>
-            <a:pPr>
-              <a:buFont typeface="Lucida Grande"/>
-              <a:buChar char="$"/>
+            <a:pPr marL="0" indent="0">
+              <a:buNone/>
             </a:pPr>
             <a:r>
               <a:rPr lang="en-US" sz="2400" dirty="0" smtClean="0">
                 <a:latin typeface="Courier New"/>
                 <a:cs typeface="Courier New"/>
               </a:rPr>
-              <a:t>./</a:t>
+              <a:t>&gt; .</a:t>
+            </a:r>
+            <a:r>
+              <a:rPr lang="en-US" sz="2400" dirty="0" smtClean="0">
+                <a:latin typeface="Courier New"/>
+                <a:cs typeface="Courier New"/>
+              </a:rPr>
+              <a:t>/</a:t>
             </a:r>
             <a:r>
               <a:rPr lang="en-US" sz="2400" dirty="0" err="1" smtClean="0">

</xml_diff>

<commit_message>
tweaked exercise with path
</commit_message>
<xml_diff>
--- a/doc/slides/day2/session1/CLIScripting.pptx
+++ b/doc/slides/day2/session1/CLIScripting.pptx
@@ -4151,14 +4151,7 @@
                 <a:latin typeface="Courier New"/>
                 <a:cs typeface="Courier New"/>
               </a:rPr>
-              <a:t> </a:t>
-            </a:r>
-            <a:r>
-              <a:rPr lang="en-US" dirty="0" smtClean="0">
-                <a:latin typeface="Courier New"/>
-                <a:cs typeface="Courier New"/>
-              </a:rPr>
-              <a:t>if [ ! -e "filename" ]; then</a:t>
+              <a:t> if [ ! -e "filename" ]; then</a:t>
             </a:r>
             <a:br>
               <a:rPr lang="en-US" dirty="0" smtClean="0">
@@ -4171,14 +4164,7 @@
                 <a:latin typeface="Courier New"/>
                 <a:cs typeface="Courier New"/>
               </a:rPr>
-              <a:t>&gt; </a:t>
-            </a:r>
-            <a:r>
-              <a:rPr lang="en-US" dirty="0" smtClean="0">
-                <a:latin typeface="Courier New"/>
-                <a:cs typeface="Courier New"/>
-              </a:rPr>
-              <a:t>touch filename</a:t>
+              <a:t>&gt; touch filename</a:t>
             </a:r>
             <a:br>
               <a:rPr lang="en-US" dirty="0" smtClean="0">
@@ -4191,14 +4177,7 @@
                 <a:latin typeface="Courier New"/>
                 <a:cs typeface="Courier New"/>
               </a:rPr>
-              <a:t>&gt; </a:t>
-            </a:r>
-            <a:r>
-              <a:rPr lang="en-US" dirty="0" smtClean="0">
-                <a:latin typeface="Courier New"/>
-                <a:cs typeface="Courier New"/>
-              </a:rPr>
-              <a:t>fi</a:t>
+              <a:t>&gt; fi</a:t>
             </a:r>
             <a:endParaRPr lang="en-US" dirty="0">
               <a:latin typeface="Courier New"/>
@@ -4337,14 +4316,7 @@
                 <a:latin typeface="Courier New"/>
                 <a:cs typeface="Courier New"/>
               </a:rPr>
-              <a:t>&gt; </a:t>
-            </a:r>
-            <a:r>
-              <a:rPr lang="en-US" dirty="0" smtClean="0">
-                <a:latin typeface="Courier New"/>
-                <a:cs typeface="Courier New"/>
-              </a:rPr>
-              <a:t>for file in $</a:t>
+              <a:t>&gt; for file in $</a:t>
             </a:r>
             <a:r>
               <a:rPr lang="en-US" dirty="0" err="1" smtClean="0">
@@ -4371,14 +4343,7 @@
                 <a:latin typeface="Courier New"/>
                 <a:cs typeface="Courier New"/>
               </a:rPr>
-              <a:t>&gt; </a:t>
-            </a:r>
-            <a:r>
-              <a:rPr lang="en-US" dirty="0" smtClean="0">
-                <a:latin typeface="Courier New"/>
-                <a:cs typeface="Courier New"/>
-              </a:rPr>
-              <a:t>echo $file</a:t>
+              <a:t>&gt; echo $file</a:t>
             </a:r>
             <a:br>
               <a:rPr lang="en-US" dirty="0" smtClean="0">
@@ -5362,15 +5327,47 @@
           <a:p>
             <a:r>
               <a:rPr lang="en-US" sz="2800" dirty="0" smtClean="0"/>
-              <a:t>In Teams, write a </a:t>
+              <a:t>In Teams, write a bash script </a:t>
             </a:r>
             <a:r>
               <a:rPr lang="en-US" sz="2800" dirty="0" smtClean="0"/>
-              <a:t>bash script </a:t>
+              <a:t>(</a:t>
+            </a:r>
+            <a:r>
+              <a:rPr lang="en-US" sz="2800" dirty="0" err="1" smtClean="0"/>
+              <a:t>cp</a:t>
             </a:r>
             <a:r>
               <a:rPr lang="en-US" sz="2800" dirty="0" smtClean="0"/>
-              <a:t>that uses script/</a:t>
+              <a:t> and modify</a:t>
+            </a:r>
+            <a:r>
+              <a:rPr lang="en-US" sz="2800" dirty="0" smtClean="0"/>
+              <a:t> /</a:t>
+            </a:r>
+            <a:r>
+              <a:rPr lang="en-US" sz="2800" dirty="0" err="1" smtClean="0"/>
+              <a:t>gsd</a:t>
+            </a:r>
+            <a:r>
+              <a:rPr lang="en-US" sz="2800" dirty="0" smtClean="0"/>
+              <a:t>/</a:t>
+            </a:r>
+            <a:r>
+              <a:rPr lang="en-US" sz="2800" dirty="0" err="1" smtClean="0"/>
+              <a:t>To_Participant</a:t>
+            </a:r>
+            <a:r>
+              <a:rPr lang="en-US" sz="2800" dirty="0" smtClean="0"/>
+              <a:t>/ARANGS13/</a:t>
+            </a:r>
+            <a:r>
+              <a:rPr lang="en-US" sz="2800" dirty="0" err="1" smtClean="0"/>
+              <a:t>arangs</a:t>
+            </a:r>
+            <a:r>
+              <a:rPr lang="en-US" sz="2800" dirty="0" smtClean="0"/>
+              <a:t>/</a:t>
             </a:r>
             <a:r>
               <a:rPr lang="en-US" sz="2800" dirty="0" err="1" smtClean="0"/>
@@ -5378,7 +5375,11 @@
             </a:r>
             <a:r>
               <a:rPr lang="en-US" sz="2800" dirty="0" smtClean="0"/>
-              <a:t> as a template that:</a:t>
+              <a:t>) </a:t>
+            </a:r>
+            <a:r>
+              <a:rPr lang="en-US" sz="2800" dirty="0" smtClean="0"/>
+              <a:t>that:</a:t>
             </a:r>
           </a:p>
           <a:p>
@@ -5397,11 +5398,7 @@
             </a:r>
             <a:r>
               <a:rPr lang="en-US" sz="2400" dirty="0" smtClean="0"/>
-              <a:t> </a:t>
-            </a:r>
-            <a:r>
-              <a:rPr lang="en-US" sz="2400" dirty="0" smtClean="0"/>
-              <a:t>file named </a:t>
+              <a:t> file named </a:t>
             </a:r>
             <a:r>
               <a:rPr lang="en-US" sz="2400" dirty="0" err="1" smtClean="0"/>
@@ -5413,7 +5410,11 @@
             <a:pPr lvl="2"/>
             <a:r>
               <a:rPr lang="en-US" sz="2000" dirty="0" smtClean="0"/>
-              <a:t>Usage:</a:t>
+              <a:t>Usage: </a:t>
+            </a:r>
+            <a:r>
+              <a:rPr lang="en-US" sz="2000" dirty="0" err="1" smtClean="0"/>
+              <a:t>team_a_script.bash</a:t>
             </a:r>
             <a:r>
               <a:rPr lang="en-US" sz="2000" dirty="0" smtClean="0"/>
@@ -5421,11 +5422,7 @@
             </a:r>
             <a:r>
               <a:rPr lang="en-US" sz="2000" dirty="0" err="1" smtClean="0"/>
-              <a:t>team_a</a:t>
-            </a:r>
-            <a:r>
-              <a:rPr lang="en-US" sz="2000" dirty="0" err="1" smtClean="0"/>
-              <a:t>_script.bash</a:t>
+              <a:t>path_to_reference</a:t>
             </a:r>
             <a:r>
               <a:rPr lang="en-US" sz="2000" dirty="0" smtClean="0"/>
@@ -5433,7 +5430,7 @@
             </a:r>
             <a:r>
               <a:rPr lang="en-US" sz="2000" dirty="0" err="1" smtClean="0"/>
-              <a:t>path_to_reference</a:t>
+              <a:t>path_to_pair_one</a:t>
             </a:r>
             <a:r>
               <a:rPr lang="en-US" sz="2000" dirty="0" smtClean="0"/>
@@ -5441,14 +5438,6 @@
             </a:r>
             <a:r>
               <a:rPr lang="en-US" sz="2000" dirty="0" err="1" smtClean="0"/>
-              <a:t>path_to_pair_one</a:t>
-            </a:r>
-            <a:r>
-              <a:rPr lang="en-US" sz="2000" dirty="0" smtClean="0"/>
-              <a:t> </a:t>
-            </a:r>
-            <a:r>
-              <a:rPr lang="en-US" sz="2000" dirty="0" err="1" smtClean="0"/>
               <a:t>path_to_pair_two</a:t>
             </a:r>
             <a:endParaRPr lang="en-US" sz="2000" dirty="0" smtClean="0"/>
@@ -5473,11 +5462,7 @@
             </a:r>
             <a:r>
               <a:rPr lang="en-US" sz="2400" dirty="0" smtClean="0"/>
-              <a:t>: </a:t>
-            </a:r>
-            <a:r>
-              <a:rPr lang="en-US" sz="2400" dirty="0" smtClean="0"/>
-              <a:t>takes the </a:t>
+              <a:t>: takes the </a:t>
             </a:r>
             <a:r>
               <a:rPr lang="en-US" sz="2400" dirty="0" err="1" smtClean="0"/>
@@ -5493,15 +5478,7 @@
             </a:r>
             <a:r>
               <a:rPr lang="en-US" sz="2400" dirty="0" smtClean="0"/>
-              <a:t>, </a:t>
-            </a:r>
-            <a:r>
-              <a:rPr lang="en-US" sz="2400" dirty="0" smtClean="0"/>
-              <a:t>and </a:t>
-            </a:r>
-            <a:r>
-              <a:rPr lang="en-US" sz="2400" dirty="0" smtClean="0"/>
-              <a:t>produces two sorted bam files named </a:t>
+              <a:t>, and produces two sorted bam files named </a:t>
             </a:r>
             <a:r>
               <a:rPr lang="en-US" sz="2400" dirty="0" err="1" smtClean="0"/>
@@ -5525,11 +5502,7 @@
             </a:r>
             <a:r>
               <a:rPr lang="en-US" sz="2000" dirty="0" err="1" smtClean="0"/>
-              <a:t>team_b_script</a:t>
-            </a:r>
-            <a:r>
-              <a:rPr lang="en-US" sz="2000" dirty="0" err="1" smtClean="0"/>
-              <a:t>.bash</a:t>
+              <a:t>team_b_script.bash</a:t>
             </a:r>
             <a:r>
               <a:rPr lang="en-US" sz="2000" dirty="0" smtClean="0"/>
@@ -6170,14 +6143,7 @@
                 <a:latin typeface="Courier New"/>
                 <a:cs typeface="Courier New"/>
               </a:rPr>
-              <a:t>&gt; </a:t>
-            </a:r>
-            <a:r>
-              <a:rPr lang="en-US" dirty="0" smtClean="0">
-                <a:latin typeface="Courier New"/>
-                <a:cs typeface="Courier New"/>
-              </a:rPr>
-              <a:t>./</a:t>
+              <a:t>&gt; ./</a:t>
             </a:r>
             <a:r>
               <a:rPr lang="en-US" dirty="0" err="1" smtClean="0">
@@ -6253,19 +6219,11 @@
           <a:p>
             <a:r>
               <a:rPr lang="en-US" dirty="0" err="1" smtClean="0"/>
-              <a:t>Hash</a:t>
-            </a:r>
-            <a:r>
-              <a:rPr lang="en-US" dirty="0" err="1" smtClean="0"/>
-              <a:t>bang</a:t>
+              <a:t>Hashbang</a:t>
             </a:r>
             <a:r>
               <a:rPr lang="en-US" dirty="0" smtClean="0"/>
-              <a:t> </a:t>
-            </a:r>
-            <a:r>
-              <a:rPr lang="en-US" dirty="0" smtClean="0"/>
-              <a:t>line</a:t>
+              <a:t> line</a:t>
             </a:r>
             <a:endParaRPr lang="en-US" dirty="0"/>
           </a:p>
@@ -6508,14 +6466,7 @@
                 <a:latin typeface="Courier New"/>
                 <a:cs typeface="Courier New"/>
               </a:rPr>
-              <a:t>&gt; echo </a:t>
-            </a:r>
-            <a:r>
-              <a:rPr lang="en-US" sz="2400" dirty="0" smtClean="0">
-                <a:latin typeface="Courier New"/>
-                <a:cs typeface="Courier New"/>
-              </a:rPr>
-              <a:t>'#!/bin/</a:t>
+              <a:t>&gt; echo '#!/bin/</a:t>
             </a:r>
             <a:r>
               <a:rPr lang="en-US" sz="2400" dirty="0" err="1" smtClean="0">
@@ -6552,14 +6503,7 @@
                 <a:latin typeface="Courier New"/>
                 <a:cs typeface="Courier New"/>
               </a:rPr>
-              <a:t>&gt; echo </a:t>
-            </a:r>
-            <a:r>
-              <a:rPr lang="en-US" sz="2400" dirty="0" smtClean="0">
-                <a:latin typeface="Courier New"/>
-                <a:cs typeface="Courier New"/>
-              </a:rPr>
-              <a:t>'echo "Hello World!"' &gt;&gt; </a:t>
+              <a:t>&gt; echo 'echo "Hello World!"' &gt;&gt; </a:t>
             </a:r>
             <a:r>
               <a:rPr lang="en-US" sz="2400" dirty="0" err="1" smtClean="0">
@@ -6582,14 +6526,7 @@
                 <a:latin typeface="Courier New"/>
                 <a:cs typeface="Courier New"/>
               </a:rPr>
-              <a:t>&gt; echo </a:t>
-            </a:r>
-            <a:r>
-              <a:rPr lang="en-US" sz="2400" dirty="0" smtClean="0">
-                <a:latin typeface="Courier New"/>
-                <a:cs typeface="Courier New"/>
-              </a:rPr>
-              <a:t>'</a:t>
+              <a:t>&gt; echo '</a:t>
             </a:r>
             <a:r>
               <a:rPr lang="en-US" sz="2400" dirty="0" err="1" smtClean="0">
@@ -6640,14 +6577,7 @@
                 <a:latin typeface="Courier New"/>
                 <a:cs typeface="Courier New"/>
               </a:rPr>
-              <a:t> </a:t>
-            </a:r>
-            <a:r>
-              <a:rPr lang="en-US" sz="2400" dirty="0" smtClean="0">
-                <a:latin typeface="Courier New"/>
-                <a:cs typeface="Courier New"/>
-              </a:rPr>
-              <a:t>u=+x </a:t>
+              <a:t> u=+x </a:t>
             </a:r>
             <a:r>
               <a:rPr lang="en-US" sz="2400" dirty="0" err="1" smtClean="0">
@@ -6670,14 +6600,7 @@
                 <a:latin typeface="Courier New"/>
                 <a:cs typeface="Courier New"/>
               </a:rPr>
-              <a:t>&gt; .</a:t>
-            </a:r>
-            <a:r>
-              <a:rPr lang="en-US" sz="2400" dirty="0" smtClean="0">
-                <a:latin typeface="Courier New"/>
-                <a:cs typeface="Courier New"/>
-              </a:rPr>
-              <a:t>/</a:t>
+              <a:t>&gt; ./</a:t>
             </a:r>
             <a:r>
               <a:rPr lang="en-US" sz="2400" dirty="0" err="1" smtClean="0">

</xml_diff>

<commit_message>
instructions for copying subset of full raw reads to run alignments on
</commit_message>
<xml_diff>
--- a/doc/slides/day2/session1/CLIScripting.pptx
+++ b/doc/slides/day2/session1/CLIScripting.pptx
@@ -5318,31 +5318,24 @@
             <p:ph idx="1"/>
           </p:nvPr>
         </p:nvSpPr>
-        <p:spPr/>
+        <p:spPr>
+          <a:xfrm>
+            <a:off x="457200" y="1484784"/>
+            <a:ext cx="8229600" cy="4525963"/>
+          </a:xfrm>
+        </p:spPr>
         <p:txBody>
           <a:bodyPr>
-            <a:normAutofit fontScale="85000" lnSpcReduction="20000"/>
+            <a:normAutofit fontScale="70000" lnSpcReduction="20000"/>
           </a:bodyPr>
           <a:lstStyle/>
           <a:p>
-            <a:r>
-              <a:rPr lang="en-US" sz="2800" dirty="0" smtClean="0"/>
-              <a:t>In Teams, write a bash script </a:t>
-            </a:r>
-            <a:r>
-              <a:rPr lang="en-US" sz="2800" dirty="0" smtClean="0"/>
-              <a:t>(</a:t>
-            </a:r>
             <a:r>
               <a:rPr lang="en-US" sz="2800" dirty="0" err="1" smtClean="0"/>
               <a:t>cp</a:t>
             </a:r>
             <a:r>
               <a:rPr lang="en-US" sz="2800" dirty="0" smtClean="0"/>
-              <a:t> and modify</a:t>
-            </a:r>
-            <a:r>
-              <a:rPr lang="en-US" sz="2800" dirty="0" smtClean="0"/>
               <a:t> /</a:t>
             </a:r>
             <a:r>
@@ -5359,6 +5352,41 @@
             </a:r>
             <a:r>
               <a:rPr lang="en-US" sz="2800" dirty="0" smtClean="0"/>
+              <a:t>/ARANGS/1-U0015717_GTGGCC_L005_R[12]_001_$NUM.bfq . # $NUM will vary from team group to team group</a:t>
+            </a:r>
+            <a:endParaRPr lang="en-US" sz="2800" dirty="0" smtClean="0"/>
+          </a:p>
+          <a:p>
+            <a:r>
+              <a:rPr lang="en-US" sz="2800" dirty="0" smtClean="0"/>
+              <a:t>In </a:t>
+            </a:r>
+            <a:r>
+              <a:rPr lang="en-US" sz="2800" dirty="0" smtClean="0"/>
+              <a:t>Teams, write a bash script (</a:t>
+            </a:r>
+            <a:r>
+              <a:rPr lang="en-US" sz="2800" dirty="0" err="1" smtClean="0"/>
+              <a:t>cp</a:t>
+            </a:r>
+            <a:r>
+              <a:rPr lang="en-US" sz="2800" dirty="0" smtClean="0"/>
+              <a:t> and modify /</a:t>
+            </a:r>
+            <a:r>
+              <a:rPr lang="en-US" sz="2800" dirty="0" err="1" smtClean="0"/>
+              <a:t>gsd</a:t>
+            </a:r>
+            <a:r>
+              <a:rPr lang="en-US" sz="2800" dirty="0" smtClean="0"/>
+              <a:t>/</a:t>
+            </a:r>
+            <a:r>
+              <a:rPr lang="en-US" sz="2800" dirty="0" err="1" smtClean="0"/>
+              <a:t>To_Participant</a:t>
+            </a:r>
+            <a:r>
+              <a:rPr lang="en-US" sz="2800" dirty="0" smtClean="0"/>
               <a:t>/ARANGS13/</a:t>
             </a:r>
             <a:r>
@@ -5374,16 +5402,16 @@
               <a:t>src</a:t>
             </a:r>
             <a:r>
-              <a:rPr lang="en-US" sz="2800" smtClean="0"/>
-              <a:t>/template.sh</a:t>
-            </a:r>
-            <a:r>
               <a:rPr lang="en-US" sz="2800" dirty="0" smtClean="0"/>
-              <a:t>) </a:t>
+              <a:t>/</a:t>
+            </a:r>
+            <a:r>
+              <a:rPr lang="en-US" sz="2800" dirty="0" err="1" smtClean="0"/>
+              <a:t>template.sh</a:t>
             </a:r>
             <a:r>
               <a:rPr lang="en-US" sz="2800" dirty="0" smtClean="0"/>
-              <a:t>that:</a:t>
+              <a:t>) that:</a:t>
             </a:r>
           </a:p>
           <a:p>

</xml_diff>